<commit_message>
updated presentation with introduction
</commit_message>
<xml_diff>
--- a/Presentation/Matt_Slides.pptx
+++ b/Presentation/Matt_Slides.pptx
@@ -4,14 +4,23 @@
   <p:sldMasterIdLst>
     <p:sldMasterId id="2147483648" r:id="rId1"/>
   </p:sldMasterIdLst>
+  <p:notesMasterIdLst>
+    <p:notesMasterId r:id="rId15"/>
+  </p:notesMasterIdLst>
   <p:sldIdLst>
-    <p:sldId id="258" r:id="rId2"/>
-    <p:sldId id="256" r:id="rId3"/>
-    <p:sldId id="260" r:id="rId4"/>
-    <p:sldId id="257" r:id="rId5"/>
-    <p:sldId id="259" r:id="rId6"/>
-    <p:sldId id="263" r:id="rId7"/>
-    <p:sldId id="264" r:id="rId8"/>
+    <p:sldId id="265" r:id="rId2"/>
+    <p:sldId id="270" r:id="rId3"/>
+    <p:sldId id="266" r:id="rId4"/>
+    <p:sldId id="267" r:id="rId5"/>
+    <p:sldId id="269" r:id="rId6"/>
+    <p:sldId id="271" r:id="rId7"/>
+    <p:sldId id="258" r:id="rId8"/>
+    <p:sldId id="256" r:id="rId9"/>
+    <p:sldId id="260" r:id="rId10"/>
+    <p:sldId id="257" r:id="rId11"/>
+    <p:sldId id="259" r:id="rId12"/>
+    <p:sldId id="263" r:id="rId13"/>
+    <p:sldId id="264" r:id="rId14"/>
   </p:sldIdLst>
   <p:sldSz cx="9144000" cy="6858000" type="screen4x3"/>
   <p:notesSz cx="6858000" cy="9144000"/>
@@ -110,7 +119,546 @@
       </a:defRPr>
     </a:lvl9pPr>
   </p:defaultTextStyle>
+  <p:extLst>
+    <p:ext uri="{EFAFB233-063F-42B5-8137-9DF3F51BA10A}">
+      <p15:sldGuideLst xmlns:p15="http://schemas.microsoft.com/office/powerpoint/2012/main">
+        <p15:guide id="1" orient="horz" pos="2160">
+          <p15:clr>
+            <a:srgbClr val="A4A3A4"/>
+          </p15:clr>
+        </p15:guide>
+        <p15:guide id="2" pos="2880">
+          <p15:clr>
+            <a:srgbClr val="A4A3A4"/>
+          </p15:clr>
+        </p15:guide>
+      </p15:sldGuideLst>
+    </p:ext>
+  </p:extLst>
 </p:presentation>
+</file>
+
+<file path=ppt/notesMasters/notesMaster1.xml><?xml version="1.0" encoding="utf-8"?>
+<p:notesMaster xmlns:a="http://schemas.openxmlformats.org/drawingml/2006/main" xmlns:r="http://schemas.openxmlformats.org/officeDocument/2006/relationships" xmlns:p="http://schemas.openxmlformats.org/presentationml/2006/main">
+  <p:cSld>
+    <p:bg>
+      <p:bgRef idx="1001">
+        <a:schemeClr val="bg1"/>
+      </p:bgRef>
+    </p:bg>
+    <p:spTree>
+      <p:nvGrpSpPr>
+        <p:cNvPr id="1" name=""/>
+        <p:cNvGrpSpPr/>
+        <p:nvPr/>
+      </p:nvGrpSpPr>
+      <p:grpSpPr>
+        <a:xfrm>
+          <a:off x="0" y="0"/>
+          <a:ext cx="0" cy="0"/>
+          <a:chOff x="0" y="0"/>
+          <a:chExt cx="0" cy="0"/>
+        </a:xfrm>
+      </p:grpSpPr>
+      <p:sp>
+        <p:nvSpPr>
+          <p:cNvPr id="2" name="Header Placeholder 1"/>
+          <p:cNvSpPr>
+            <a:spLocks noGrp="1"/>
+          </p:cNvSpPr>
+          <p:nvPr>
+            <p:ph type="hdr" sz="quarter"/>
+          </p:nvPr>
+        </p:nvSpPr>
+        <p:spPr>
+          <a:xfrm>
+            <a:off x="0" y="0"/>
+            <a:ext cx="2971800" cy="458788"/>
+          </a:xfrm>
+          <a:prstGeom prst="rect">
+            <a:avLst/>
+          </a:prstGeom>
+        </p:spPr>
+        <p:txBody>
+          <a:bodyPr vert="horz" lIns="91440" tIns="45720" rIns="91440" bIns="45720" rtlCol="0"/>
+          <a:lstStyle>
+            <a:lvl1pPr algn="l">
+              <a:defRPr sz="1200"/>
+            </a:lvl1pPr>
+          </a:lstStyle>
+          <a:p>
+            <a:endParaRPr lang="en-US"/>
+          </a:p>
+        </p:txBody>
+      </p:sp>
+      <p:sp>
+        <p:nvSpPr>
+          <p:cNvPr id="3" name="Date Placeholder 2"/>
+          <p:cNvSpPr>
+            <a:spLocks noGrp="1"/>
+          </p:cNvSpPr>
+          <p:nvPr>
+            <p:ph type="dt" idx="1"/>
+          </p:nvPr>
+        </p:nvSpPr>
+        <p:spPr>
+          <a:xfrm>
+            <a:off x="3884613" y="0"/>
+            <a:ext cx="2971800" cy="458788"/>
+          </a:xfrm>
+          <a:prstGeom prst="rect">
+            <a:avLst/>
+          </a:prstGeom>
+        </p:spPr>
+        <p:txBody>
+          <a:bodyPr vert="horz" lIns="91440" tIns="45720" rIns="91440" bIns="45720" rtlCol="0"/>
+          <a:lstStyle>
+            <a:lvl1pPr algn="r">
+              <a:defRPr sz="1200"/>
+            </a:lvl1pPr>
+          </a:lstStyle>
+          <a:p>
+            <a:fld id="{81B50C04-BD6A-44E4-801F-9ADD223EC4B3}" type="datetimeFigureOut">
+              <a:rPr lang="en-US" smtClean="0"/>
+              <a:t>4/24/2017</a:t>
+            </a:fld>
+            <a:endParaRPr lang="en-US"/>
+          </a:p>
+        </p:txBody>
+      </p:sp>
+      <p:sp>
+        <p:nvSpPr>
+          <p:cNvPr id="4" name="Slide Image Placeholder 3"/>
+          <p:cNvSpPr>
+            <a:spLocks noGrp="1" noRot="1" noChangeAspect="1"/>
+          </p:cNvSpPr>
+          <p:nvPr>
+            <p:ph type="sldImg" idx="2"/>
+          </p:nvPr>
+        </p:nvSpPr>
+        <p:spPr>
+          <a:xfrm>
+            <a:off x="1371600" y="1143000"/>
+            <a:ext cx="4114800" cy="3086100"/>
+          </a:xfrm>
+          <a:prstGeom prst="rect">
+            <a:avLst/>
+          </a:prstGeom>
+          <a:noFill/>
+          <a:ln w="12700">
+            <a:solidFill>
+              <a:prstClr val="black"/>
+            </a:solidFill>
+          </a:ln>
+        </p:spPr>
+        <p:txBody>
+          <a:bodyPr vert="horz" lIns="91440" tIns="45720" rIns="91440" bIns="45720" rtlCol="0" anchor="ctr"/>
+          <a:lstStyle/>
+          <a:p>
+            <a:endParaRPr lang="en-US"/>
+          </a:p>
+        </p:txBody>
+      </p:sp>
+      <p:sp>
+        <p:nvSpPr>
+          <p:cNvPr id="5" name="Notes Placeholder 4"/>
+          <p:cNvSpPr>
+            <a:spLocks noGrp="1"/>
+          </p:cNvSpPr>
+          <p:nvPr>
+            <p:ph type="body" sz="quarter" idx="3"/>
+          </p:nvPr>
+        </p:nvSpPr>
+        <p:spPr>
+          <a:xfrm>
+            <a:off x="685800" y="4400550"/>
+            <a:ext cx="5486400" cy="3600450"/>
+          </a:xfrm>
+          <a:prstGeom prst="rect">
+            <a:avLst/>
+          </a:prstGeom>
+        </p:spPr>
+        <p:txBody>
+          <a:bodyPr vert="horz" lIns="91440" tIns="45720" rIns="91440" bIns="45720" rtlCol="0"/>
+          <a:lstStyle/>
+          <a:p>
+            <a:pPr lvl="0"/>
+            <a:r>
+              <a:rPr lang="en-US"/>
+              <a:t>Edit Master text styles</a:t>
+            </a:r>
+          </a:p>
+          <a:p>
+            <a:pPr lvl="1"/>
+            <a:r>
+              <a:rPr lang="en-US"/>
+              <a:t>Second level</a:t>
+            </a:r>
+          </a:p>
+          <a:p>
+            <a:pPr lvl="2"/>
+            <a:r>
+              <a:rPr lang="en-US"/>
+              <a:t>Third level</a:t>
+            </a:r>
+          </a:p>
+          <a:p>
+            <a:pPr lvl="3"/>
+            <a:r>
+              <a:rPr lang="en-US"/>
+              <a:t>Fourth level</a:t>
+            </a:r>
+          </a:p>
+          <a:p>
+            <a:pPr lvl="4"/>
+            <a:r>
+              <a:rPr lang="en-US"/>
+              <a:t>Fifth level</a:t>
+            </a:r>
+          </a:p>
+        </p:txBody>
+      </p:sp>
+      <p:sp>
+        <p:nvSpPr>
+          <p:cNvPr id="6" name="Footer Placeholder 5"/>
+          <p:cNvSpPr>
+            <a:spLocks noGrp="1"/>
+          </p:cNvSpPr>
+          <p:nvPr>
+            <p:ph type="ftr" sz="quarter" idx="4"/>
+          </p:nvPr>
+        </p:nvSpPr>
+        <p:spPr>
+          <a:xfrm>
+            <a:off x="0" y="8685213"/>
+            <a:ext cx="2971800" cy="458787"/>
+          </a:xfrm>
+          <a:prstGeom prst="rect">
+            <a:avLst/>
+          </a:prstGeom>
+        </p:spPr>
+        <p:txBody>
+          <a:bodyPr vert="horz" lIns="91440" tIns="45720" rIns="91440" bIns="45720" rtlCol="0" anchor="b"/>
+          <a:lstStyle>
+            <a:lvl1pPr algn="l">
+              <a:defRPr sz="1200"/>
+            </a:lvl1pPr>
+          </a:lstStyle>
+          <a:p>
+            <a:endParaRPr lang="en-US"/>
+          </a:p>
+        </p:txBody>
+      </p:sp>
+      <p:sp>
+        <p:nvSpPr>
+          <p:cNvPr id="7" name="Slide Number Placeholder 6"/>
+          <p:cNvSpPr>
+            <a:spLocks noGrp="1"/>
+          </p:cNvSpPr>
+          <p:nvPr>
+            <p:ph type="sldNum" sz="quarter" idx="5"/>
+          </p:nvPr>
+        </p:nvSpPr>
+        <p:spPr>
+          <a:xfrm>
+            <a:off x="3884613" y="8685213"/>
+            <a:ext cx="2971800" cy="458787"/>
+          </a:xfrm>
+          <a:prstGeom prst="rect">
+            <a:avLst/>
+          </a:prstGeom>
+        </p:spPr>
+        <p:txBody>
+          <a:bodyPr vert="horz" lIns="91440" tIns="45720" rIns="91440" bIns="45720" rtlCol="0" anchor="b"/>
+          <a:lstStyle>
+            <a:lvl1pPr algn="r">
+              <a:defRPr sz="1200"/>
+            </a:lvl1pPr>
+          </a:lstStyle>
+          <a:p>
+            <a:fld id="{90BE9F6D-7E52-4D7E-8BC6-973AB50FB721}" type="slidenum">
+              <a:rPr lang="en-US" smtClean="0"/>
+              <a:t>‹#›</a:t>
+            </a:fld>
+            <a:endParaRPr lang="en-US"/>
+          </a:p>
+        </p:txBody>
+      </p:sp>
+    </p:spTree>
+    <p:extLst>
+      <p:ext uri="{BB962C8B-B14F-4D97-AF65-F5344CB8AC3E}">
+        <p14:creationId xmlns:p14="http://schemas.microsoft.com/office/powerpoint/2010/main" val="3038441576"/>
+      </p:ext>
+    </p:extLst>
+  </p:cSld>
+  <p:clrMap bg1="lt1" tx1="dk1" bg2="lt2" tx2="dk2" accent1="accent1" accent2="accent2" accent3="accent3" accent4="accent4" accent5="accent5" accent6="accent6" hlink="hlink" folHlink="folHlink"/>
+  <p:notesStyle>
+    <a:lvl1pPr marL="0" algn="l" defTabSz="914400" rtl="0" eaLnBrk="1" latinLnBrk="0" hangingPunct="1">
+      <a:defRPr sz="1200" kern="1200">
+        <a:solidFill>
+          <a:schemeClr val="tx1"/>
+        </a:solidFill>
+        <a:latin typeface="+mn-lt"/>
+        <a:ea typeface="+mn-ea"/>
+        <a:cs typeface="+mn-cs"/>
+      </a:defRPr>
+    </a:lvl1pPr>
+    <a:lvl2pPr marL="457200" algn="l" defTabSz="914400" rtl="0" eaLnBrk="1" latinLnBrk="0" hangingPunct="1">
+      <a:defRPr sz="1200" kern="1200">
+        <a:solidFill>
+          <a:schemeClr val="tx1"/>
+        </a:solidFill>
+        <a:latin typeface="+mn-lt"/>
+        <a:ea typeface="+mn-ea"/>
+        <a:cs typeface="+mn-cs"/>
+      </a:defRPr>
+    </a:lvl2pPr>
+    <a:lvl3pPr marL="914400" algn="l" defTabSz="914400" rtl="0" eaLnBrk="1" latinLnBrk="0" hangingPunct="1">
+      <a:defRPr sz="1200" kern="1200">
+        <a:solidFill>
+          <a:schemeClr val="tx1"/>
+        </a:solidFill>
+        <a:latin typeface="+mn-lt"/>
+        <a:ea typeface="+mn-ea"/>
+        <a:cs typeface="+mn-cs"/>
+      </a:defRPr>
+    </a:lvl3pPr>
+    <a:lvl4pPr marL="1371600" algn="l" defTabSz="914400" rtl="0" eaLnBrk="1" latinLnBrk="0" hangingPunct="1">
+      <a:defRPr sz="1200" kern="1200">
+        <a:solidFill>
+          <a:schemeClr val="tx1"/>
+        </a:solidFill>
+        <a:latin typeface="+mn-lt"/>
+        <a:ea typeface="+mn-ea"/>
+        <a:cs typeface="+mn-cs"/>
+      </a:defRPr>
+    </a:lvl4pPr>
+    <a:lvl5pPr marL="1828800" algn="l" defTabSz="914400" rtl="0" eaLnBrk="1" latinLnBrk="0" hangingPunct="1">
+      <a:defRPr sz="1200" kern="1200">
+        <a:solidFill>
+          <a:schemeClr val="tx1"/>
+        </a:solidFill>
+        <a:latin typeface="+mn-lt"/>
+        <a:ea typeface="+mn-ea"/>
+        <a:cs typeface="+mn-cs"/>
+      </a:defRPr>
+    </a:lvl5pPr>
+    <a:lvl6pPr marL="2286000" algn="l" defTabSz="914400" rtl="0" eaLnBrk="1" latinLnBrk="0" hangingPunct="1">
+      <a:defRPr sz="1200" kern="1200">
+        <a:solidFill>
+          <a:schemeClr val="tx1"/>
+        </a:solidFill>
+        <a:latin typeface="+mn-lt"/>
+        <a:ea typeface="+mn-ea"/>
+        <a:cs typeface="+mn-cs"/>
+      </a:defRPr>
+    </a:lvl6pPr>
+    <a:lvl7pPr marL="2743200" algn="l" defTabSz="914400" rtl="0" eaLnBrk="1" latinLnBrk="0" hangingPunct="1">
+      <a:defRPr sz="1200" kern="1200">
+        <a:solidFill>
+          <a:schemeClr val="tx1"/>
+        </a:solidFill>
+        <a:latin typeface="+mn-lt"/>
+        <a:ea typeface="+mn-ea"/>
+        <a:cs typeface="+mn-cs"/>
+      </a:defRPr>
+    </a:lvl7pPr>
+    <a:lvl8pPr marL="3200400" algn="l" defTabSz="914400" rtl="0" eaLnBrk="1" latinLnBrk="0" hangingPunct="1">
+      <a:defRPr sz="1200" kern="1200">
+        <a:solidFill>
+          <a:schemeClr val="tx1"/>
+        </a:solidFill>
+        <a:latin typeface="+mn-lt"/>
+        <a:ea typeface="+mn-ea"/>
+        <a:cs typeface="+mn-cs"/>
+      </a:defRPr>
+    </a:lvl8pPr>
+    <a:lvl9pPr marL="3657600" algn="l" defTabSz="914400" rtl="0" eaLnBrk="1" latinLnBrk="0" hangingPunct="1">
+      <a:defRPr sz="1200" kern="1200">
+        <a:solidFill>
+          <a:schemeClr val="tx1"/>
+        </a:solidFill>
+        <a:latin typeface="+mn-lt"/>
+        <a:ea typeface="+mn-ea"/>
+        <a:cs typeface="+mn-cs"/>
+      </a:defRPr>
+    </a:lvl9pPr>
+  </p:notesStyle>
+</p:notesMaster>
+</file>
+
+<file path=ppt/notesSlides/notesSlide1.xml><?xml version="1.0" encoding="utf-8"?>
+<p:notes xmlns:a="http://schemas.openxmlformats.org/drawingml/2006/main" xmlns:r="http://schemas.openxmlformats.org/officeDocument/2006/relationships" xmlns:p="http://schemas.openxmlformats.org/presentationml/2006/main">
+  <p:cSld>
+    <p:spTree>
+      <p:nvGrpSpPr>
+        <p:cNvPr id="1" name=""/>
+        <p:cNvGrpSpPr/>
+        <p:nvPr/>
+      </p:nvGrpSpPr>
+      <p:grpSpPr>
+        <a:xfrm>
+          <a:off x="0" y="0"/>
+          <a:ext cx="0" cy="0"/>
+          <a:chOff x="0" y="0"/>
+          <a:chExt cx="0" cy="0"/>
+        </a:xfrm>
+      </p:grpSpPr>
+      <p:sp>
+        <p:nvSpPr>
+          <p:cNvPr id="2" name="Slide Image Placeholder 1"/>
+          <p:cNvSpPr>
+            <a:spLocks noGrp="1" noRot="1" noChangeAspect="1"/>
+          </p:cNvSpPr>
+          <p:nvPr>
+            <p:ph type="sldImg"/>
+          </p:nvPr>
+        </p:nvSpPr>
+        <p:spPr/>
+      </p:sp>
+      <p:sp>
+        <p:nvSpPr>
+          <p:cNvPr id="3" name="Notes Placeholder 2"/>
+          <p:cNvSpPr>
+            <a:spLocks noGrp="1"/>
+          </p:cNvSpPr>
+          <p:nvPr>
+            <p:ph type="body" idx="1"/>
+          </p:nvPr>
+        </p:nvSpPr>
+        <p:spPr/>
+        <p:txBody>
+          <a:bodyPr/>
+          <a:lstStyle/>
+          <a:p>
+            <a:r>
+              <a:rPr lang="en-US" dirty="0"/>
+              <a:t>SNP data from such arrays can also be a resource for germplasm management in breeding programs and has a role in genomic selection strategies for crop improvement.</a:t>
+            </a:r>
+          </a:p>
+        </p:txBody>
+      </p:sp>
+      <p:sp>
+        <p:nvSpPr>
+          <p:cNvPr id="4" name="Slide Number Placeholder 3"/>
+          <p:cNvSpPr>
+            <a:spLocks noGrp="1"/>
+          </p:cNvSpPr>
+          <p:nvPr>
+            <p:ph type="sldNum" sz="quarter" idx="10"/>
+          </p:nvPr>
+        </p:nvSpPr>
+        <p:spPr/>
+        <p:txBody>
+          <a:bodyPr/>
+          <a:lstStyle/>
+          <a:p>
+            <a:fld id="{90BE9F6D-7E52-4D7E-8BC6-973AB50FB721}" type="slidenum">
+              <a:rPr lang="en-US" smtClean="0"/>
+              <a:t>2</a:t>
+            </a:fld>
+            <a:endParaRPr lang="en-US"/>
+          </a:p>
+        </p:txBody>
+      </p:sp>
+    </p:spTree>
+    <p:extLst>
+      <p:ext uri="{BB962C8B-B14F-4D97-AF65-F5344CB8AC3E}">
+        <p14:creationId xmlns:p14="http://schemas.microsoft.com/office/powerpoint/2010/main" val="3595320740"/>
+      </p:ext>
+    </p:extLst>
+  </p:cSld>
+  <p:clrMapOvr>
+    <a:masterClrMapping/>
+  </p:clrMapOvr>
+</p:notes>
+</file>
+
+<file path=ppt/notesSlides/notesSlide2.xml><?xml version="1.0" encoding="utf-8"?>
+<p:notes xmlns:a="http://schemas.openxmlformats.org/drawingml/2006/main" xmlns:r="http://schemas.openxmlformats.org/officeDocument/2006/relationships" xmlns:p="http://schemas.openxmlformats.org/presentationml/2006/main">
+  <p:cSld>
+    <p:spTree>
+      <p:nvGrpSpPr>
+        <p:cNvPr id="1" name=""/>
+        <p:cNvGrpSpPr/>
+        <p:nvPr/>
+      </p:nvGrpSpPr>
+      <p:grpSpPr>
+        <a:xfrm>
+          <a:off x="0" y="0"/>
+          <a:ext cx="0" cy="0"/>
+          <a:chOff x="0" y="0"/>
+          <a:chExt cx="0" cy="0"/>
+        </a:xfrm>
+      </p:grpSpPr>
+      <p:sp>
+        <p:nvSpPr>
+          <p:cNvPr id="2" name="Slide Image Placeholder 1"/>
+          <p:cNvSpPr>
+            <a:spLocks noGrp="1" noRot="1" noChangeAspect="1"/>
+          </p:cNvSpPr>
+          <p:nvPr>
+            <p:ph type="sldImg"/>
+          </p:nvPr>
+        </p:nvSpPr>
+        <p:spPr/>
+      </p:sp>
+      <p:sp>
+        <p:nvSpPr>
+          <p:cNvPr id="3" name="Notes Placeholder 2"/>
+          <p:cNvSpPr>
+            <a:spLocks noGrp="1"/>
+          </p:cNvSpPr>
+          <p:nvPr>
+            <p:ph type="body" idx="1"/>
+          </p:nvPr>
+        </p:nvSpPr>
+        <p:spPr/>
+        <p:txBody>
+          <a:bodyPr/>
+          <a:lstStyle/>
+          <a:p>
+            <a:r>
+              <a:rPr lang="en-US" dirty="0"/>
+              <a:t>Processing and field-grown fresh market tomatoes are now distinct sub-populations</a:t>
+            </a:r>
+          </a:p>
+        </p:txBody>
+      </p:sp>
+      <p:sp>
+        <p:nvSpPr>
+          <p:cNvPr id="4" name="Slide Number Placeholder 3"/>
+          <p:cNvSpPr>
+            <a:spLocks noGrp="1"/>
+          </p:cNvSpPr>
+          <p:nvPr>
+            <p:ph type="sldNum" sz="quarter" idx="10"/>
+          </p:nvPr>
+        </p:nvSpPr>
+        <p:spPr/>
+        <p:txBody>
+          <a:bodyPr/>
+          <a:lstStyle/>
+          <a:p>
+            <a:fld id="{90BE9F6D-7E52-4D7E-8BC6-973AB50FB721}" type="slidenum">
+              <a:rPr lang="en-US" smtClean="0"/>
+              <a:t>3</a:t>
+            </a:fld>
+            <a:endParaRPr lang="en-US"/>
+          </a:p>
+        </p:txBody>
+      </p:sp>
+    </p:spTree>
+    <p:extLst>
+      <p:ext uri="{BB962C8B-B14F-4D97-AF65-F5344CB8AC3E}">
+        <p14:creationId xmlns:p14="http://schemas.microsoft.com/office/powerpoint/2010/main" val="3907317702"/>
+      </p:ext>
+    </p:extLst>
+  </p:cSld>
+  <p:clrMapOvr>
+    <a:masterClrMapping/>
+  </p:clrMapOvr>
+</p:notes>
 </file>
 
 <file path=ppt/slideLayouts/slideLayout1.xml><?xml version="1.0" encoding="utf-8"?>
@@ -151,10 +699,9 @@
           <a:lstStyle/>
           <a:p>
             <a:r>
-              <a:rPr lang="en-US" smtClean="0"/>
+              <a:rPr lang="en-US"/>
               <a:t>Click to edit Master title style</a:t>
             </a:r>
-            <a:endParaRPr lang="en-US"/>
           </a:p>
         </p:txBody>
       </p:sp>
@@ -270,10 +817,9 @@
           </a:lstStyle>
           <a:p>
             <a:r>
-              <a:rPr lang="en-US" smtClean="0"/>
+              <a:rPr lang="en-US"/>
               <a:t>Click to edit Master subtitle style</a:t>
             </a:r>
-            <a:endParaRPr lang="en-US"/>
           </a:p>
         </p:txBody>
       </p:sp>
@@ -388,10 +934,9 @@
           <a:lstStyle/>
           <a:p>
             <a:r>
-              <a:rPr lang="en-US" smtClean="0"/>
+              <a:rPr lang="en-US"/>
               <a:t>Click to edit Master title style</a:t>
             </a:r>
-            <a:endParaRPr lang="en-US"/>
           </a:p>
         </p:txBody>
       </p:sp>
@@ -412,38 +957,37 @@
           <a:p>
             <a:pPr lvl="0"/>
             <a:r>
-              <a:rPr lang="en-US" smtClean="0"/>
+              <a:rPr lang="en-US"/>
               <a:t>Click to edit Master text styles</a:t>
             </a:r>
           </a:p>
           <a:p>
             <a:pPr lvl="1"/>
             <a:r>
-              <a:rPr lang="en-US" smtClean="0"/>
+              <a:rPr lang="en-US"/>
               <a:t>Second level</a:t>
             </a:r>
           </a:p>
           <a:p>
             <a:pPr lvl="2"/>
             <a:r>
-              <a:rPr lang="en-US" smtClean="0"/>
+              <a:rPr lang="en-US"/>
               <a:t>Third level</a:t>
             </a:r>
           </a:p>
           <a:p>
             <a:pPr lvl="3"/>
             <a:r>
-              <a:rPr lang="en-US" smtClean="0"/>
+              <a:rPr lang="en-US"/>
               <a:t>Fourth level</a:t>
             </a:r>
           </a:p>
           <a:p>
             <a:pPr lvl="4"/>
             <a:r>
-              <a:rPr lang="en-US" smtClean="0"/>
+              <a:rPr lang="en-US"/>
               <a:t>Fifth level</a:t>
             </a:r>
-            <a:endParaRPr lang="en-US"/>
           </a:p>
         </p:txBody>
       </p:sp>
@@ -563,10 +1107,9 @@
           <a:lstStyle/>
           <a:p>
             <a:r>
-              <a:rPr lang="en-US" smtClean="0"/>
+              <a:rPr lang="en-US"/>
               <a:t>Click to edit Master title style</a:t>
             </a:r>
-            <a:endParaRPr lang="en-US"/>
           </a:p>
         </p:txBody>
       </p:sp>
@@ -592,38 +1135,37 @@
           <a:p>
             <a:pPr lvl="0"/>
             <a:r>
-              <a:rPr lang="en-US" smtClean="0"/>
+              <a:rPr lang="en-US"/>
               <a:t>Click to edit Master text styles</a:t>
             </a:r>
           </a:p>
           <a:p>
             <a:pPr lvl="1"/>
             <a:r>
-              <a:rPr lang="en-US" smtClean="0"/>
+              <a:rPr lang="en-US"/>
               <a:t>Second level</a:t>
             </a:r>
           </a:p>
           <a:p>
             <a:pPr lvl="2"/>
             <a:r>
-              <a:rPr lang="en-US" smtClean="0"/>
+              <a:rPr lang="en-US"/>
               <a:t>Third level</a:t>
             </a:r>
           </a:p>
           <a:p>
             <a:pPr lvl="3"/>
             <a:r>
-              <a:rPr lang="en-US" smtClean="0"/>
+              <a:rPr lang="en-US"/>
               <a:t>Fourth level</a:t>
             </a:r>
           </a:p>
           <a:p>
             <a:pPr lvl="4"/>
             <a:r>
-              <a:rPr lang="en-US" smtClean="0"/>
+              <a:rPr lang="en-US"/>
               <a:t>Fifth level</a:t>
             </a:r>
-            <a:endParaRPr lang="en-US"/>
           </a:p>
         </p:txBody>
       </p:sp>
@@ -738,10 +1280,9 @@
           <a:lstStyle/>
           <a:p>
             <a:r>
-              <a:rPr lang="en-US" smtClean="0"/>
+              <a:rPr lang="en-US"/>
               <a:t>Click to edit Master title style</a:t>
             </a:r>
-            <a:endParaRPr lang="en-US"/>
           </a:p>
         </p:txBody>
       </p:sp>
@@ -762,38 +1303,37 @@
           <a:p>
             <a:pPr lvl="0"/>
             <a:r>
-              <a:rPr lang="en-US" smtClean="0"/>
+              <a:rPr lang="en-US"/>
               <a:t>Click to edit Master text styles</a:t>
             </a:r>
           </a:p>
           <a:p>
             <a:pPr lvl="1"/>
             <a:r>
-              <a:rPr lang="en-US" smtClean="0"/>
+              <a:rPr lang="en-US"/>
               <a:t>Second level</a:t>
             </a:r>
           </a:p>
           <a:p>
             <a:pPr lvl="2"/>
             <a:r>
-              <a:rPr lang="en-US" smtClean="0"/>
+              <a:rPr lang="en-US"/>
               <a:t>Third level</a:t>
             </a:r>
           </a:p>
           <a:p>
             <a:pPr lvl="3"/>
             <a:r>
-              <a:rPr lang="en-US" smtClean="0"/>
+              <a:rPr lang="en-US"/>
               <a:t>Fourth level</a:t>
             </a:r>
           </a:p>
           <a:p>
             <a:pPr lvl="4"/>
             <a:r>
-              <a:rPr lang="en-US" smtClean="0"/>
+              <a:rPr lang="en-US"/>
               <a:t>Fifth level</a:t>
             </a:r>
-            <a:endParaRPr lang="en-US"/>
           </a:p>
         </p:txBody>
       </p:sp>
@@ -917,10 +1457,9 @@
           </a:lstStyle>
           <a:p>
             <a:r>
-              <a:rPr lang="en-US" smtClean="0"/>
+              <a:rPr lang="en-US"/>
               <a:t>Click to edit Master title style</a:t>
             </a:r>
-            <a:endParaRPr lang="en-US"/>
           </a:p>
         </p:txBody>
       </p:sp>
@@ -1037,7 +1576,7 @@
           <a:p>
             <a:pPr lvl="0"/>
             <a:r>
-              <a:rPr lang="en-US" smtClean="0"/>
+              <a:rPr lang="en-US"/>
               <a:t>Click to edit Master text styles</a:t>
             </a:r>
           </a:p>
@@ -1154,10 +1693,9 @@
           <a:lstStyle/>
           <a:p>
             <a:r>
-              <a:rPr lang="en-US" smtClean="0"/>
+              <a:rPr lang="en-US"/>
               <a:t>Click to edit Master title style</a:t>
             </a:r>
-            <a:endParaRPr lang="en-US"/>
           </a:p>
         </p:txBody>
       </p:sp>
@@ -1211,38 +1749,37 @@
           <a:p>
             <a:pPr lvl="0"/>
             <a:r>
-              <a:rPr lang="en-US" smtClean="0"/>
+              <a:rPr lang="en-US"/>
               <a:t>Click to edit Master text styles</a:t>
             </a:r>
           </a:p>
           <a:p>
             <a:pPr lvl="1"/>
             <a:r>
-              <a:rPr lang="en-US" smtClean="0"/>
+              <a:rPr lang="en-US"/>
               <a:t>Second level</a:t>
             </a:r>
           </a:p>
           <a:p>
             <a:pPr lvl="2"/>
             <a:r>
-              <a:rPr lang="en-US" smtClean="0"/>
+              <a:rPr lang="en-US"/>
               <a:t>Third level</a:t>
             </a:r>
           </a:p>
           <a:p>
             <a:pPr lvl="3"/>
             <a:r>
-              <a:rPr lang="en-US" smtClean="0"/>
+              <a:rPr lang="en-US"/>
               <a:t>Fourth level</a:t>
             </a:r>
           </a:p>
           <a:p>
             <a:pPr lvl="4"/>
             <a:r>
-              <a:rPr lang="en-US" smtClean="0"/>
+              <a:rPr lang="en-US"/>
               <a:t>Fifth level</a:t>
             </a:r>
-            <a:endParaRPr lang="en-US"/>
           </a:p>
         </p:txBody>
       </p:sp>
@@ -1296,38 +1833,37 @@
           <a:p>
             <a:pPr lvl="0"/>
             <a:r>
-              <a:rPr lang="en-US" smtClean="0"/>
+              <a:rPr lang="en-US"/>
               <a:t>Click to edit Master text styles</a:t>
             </a:r>
           </a:p>
           <a:p>
             <a:pPr lvl="1"/>
             <a:r>
-              <a:rPr lang="en-US" smtClean="0"/>
+              <a:rPr lang="en-US"/>
               <a:t>Second level</a:t>
             </a:r>
           </a:p>
           <a:p>
             <a:pPr lvl="2"/>
             <a:r>
-              <a:rPr lang="en-US" smtClean="0"/>
+              <a:rPr lang="en-US"/>
               <a:t>Third level</a:t>
             </a:r>
           </a:p>
           <a:p>
             <a:pPr lvl="3"/>
             <a:r>
-              <a:rPr lang="en-US" smtClean="0"/>
+              <a:rPr lang="en-US"/>
               <a:t>Fourth level</a:t>
             </a:r>
           </a:p>
           <a:p>
             <a:pPr lvl="4"/>
             <a:r>
-              <a:rPr lang="en-US" smtClean="0"/>
+              <a:rPr lang="en-US"/>
               <a:t>Fifth level</a:t>
             </a:r>
-            <a:endParaRPr lang="en-US"/>
           </a:p>
         </p:txBody>
       </p:sp>
@@ -1446,10 +1982,9 @@
           </a:lstStyle>
           <a:p>
             <a:r>
-              <a:rPr lang="en-US" smtClean="0"/>
+              <a:rPr lang="en-US"/>
               <a:t>Click to edit Master title style</a:t>
             </a:r>
-            <a:endParaRPr lang="en-US"/>
           </a:p>
         </p:txBody>
       </p:sp>
@@ -1512,7 +2047,7 @@
           <a:p>
             <a:pPr lvl="0"/>
             <a:r>
-              <a:rPr lang="en-US" smtClean="0"/>
+              <a:rPr lang="en-US"/>
               <a:t>Click to edit Master text styles</a:t>
             </a:r>
           </a:p>
@@ -1568,38 +2103,37 @@
           <a:p>
             <a:pPr lvl="0"/>
             <a:r>
-              <a:rPr lang="en-US" smtClean="0"/>
+              <a:rPr lang="en-US"/>
               <a:t>Click to edit Master text styles</a:t>
             </a:r>
           </a:p>
           <a:p>
             <a:pPr lvl="1"/>
             <a:r>
-              <a:rPr lang="en-US" smtClean="0"/>
+              <a:rPr lang="en-US"/>
               <a:t>Second level</a:t>
             </a:r>
           </a:p>
           <a:p>
             <a:pPr lvl="2"/>
             <a:r>
-              <a:rPr lang="en-US" smtClean="0"/>
+              <a:rPr lang="en-US"/>
               <a:t>Third level</a:t>
             </a:r>
           </a:p>
           <a:p>
             <a:pPr lvl="3"/>
             <a:r>
-              <a:rPr lang="en-US" smtClean="0"/>
+              <a:rPr lang="en-US"/>
               <a:t>Fourth level</a:t>
             </a:r>
           </a:p>
           <a:p>
             <a:pPr lvl="4"/>
             <a:r>
-              <a:rPr lang="en-US" smtClean="0"/>
+              <a:rPr lang="en-US"/>
               <a:t>Fifth level</a:t>
             </a:r>
-            <a:endParaRPr lang="en-US"/>
           </a:p>
         </p:txBody>
       </p:sp>
@@ -1662,7 +2196,7 @@
           <a:p>
             <a:pPr lvl="0"/>
             <a:r>
-              <a:rPr lang="en-US" smtClean="0"/>
+              <a:rPr lang="en-US"/>
               <a:t>Click to edit Master text styles</a:t>
             </a:r>
           </a:p>
@@ -1718,38 +2252,37 @@
           <a:p>
             <a:pPr lvl="0"/>
             <a:r>
-              <a:rPr lang="en-US" smtClean="0"/>
+              <a:rPr lang="en-US"/>
               <a:t>Click to edit Master text styles</a:t>
             </a:r>
           </a:p>
           <a:p>
             <a:pPr lvl="1"/>
             <a:r>
-              <a:rPr lang="en-US" smtClean="0"/>
+              <a:rPr lang="en-US"/>
               <a:t>Second level</a:t>
             </a:r>
           </a:p>
           <a:p>
             <a:pPr lvl="2"/>
             <a:r>
-              <a:rPr lang="en-US" smtClean="0"/>
+              <a:rPr lang="en-US"/>
               <a:t>Third level</a:t>
             </a:r>
           </a:p>
           <a:p>
             <a:pPr lvl="3"/>
             <a:r>
-              <a:rPr lang="en-US" smtClean="0"/>
+              <a:rPr lang="en-US"/>
               <a:t>Fourth level</a:t>
             </a:r>
           </a:p>
           <a:p>
             <a:pPr lvl="4"/>
             <a:r>
-              <a:rPr lang="en-US" smtClean="0"/>
+              <a:rPr lang="en-US"/>
               <a:t>Fifth level</a:t>
             </a:r>
-            <a:endParaRPr lang="en-US"/>
           </a:p>
         </p:txBody>
       </p:sp>
@@ -1864,10 +2397,9 @@
           <a:lstStyle/>
           <a:p>
             <a:r>
-              <a:rPr lang="en-US" smtClean="0"/>
+              <a:rPr lang="en-US"/>
               <a:t>Click to edit Master title style</a:t>
             </a:r>
-            <a:endParaRPr lang="en-US"/>
           </a:p>
         </p:txBody>
       </p:sp>
@@ -2086,10 +2618,9 @@
           </a:lstStyle>
           <a:p>
             <a:r>
-              <a:rPr lang="en-US" smtClean="0"/>
+              <a:rPr lang="en-US"/>
               <a:t>Click to edit Master title style</a:t>
             </a:r>
-            <a:endParaRPr lang="en-US"/>
           </a:p>
         </p:txBody>
       </p:sp>
@@ -2143,38 +2674,37 @@
           <a:p>
             <a:pPr lvl="0"/>
             <a:r>
-              <a:rPr lang="en-US" smtClean="0"/>
+              <a:rPr lang="en-US"/>
               <a:t>Click to edit Master text styles</a:t>
             </a:r>
           </a:p>
           <a:p>
             <a:pPr lvl="1"/>
             <a:r>
-              <a:rPr lang="en-US" smtClean="0"/>
+              <a:rPr lang="en-US"/>
               <a:t>Second level</a:t>
             </a:r>
           </a:p>
           <a:p>
             <a:pPr lvl="2"/>
             <a:r>
-              <a:rPr lang="en-US" smtClean="0"/>
+              <a:rPr lang="en-US"/>
               <a:t>Third level</a:t>
             </a:r>
           </a:p>
           <a:p>
             <a:pPr lvl="3"/>
             <a:r>
-              <a:rPr lang="en-US" smtClean="0"/>
+              <a:rPr lang="en-US"/>
               <a:t>Fourth level</a:t>
             </a:r>
           </a:p>
           <a:p>
             <a:pPr lvl="4"/>
             <a:r>
-              <a:rPr lang="en-US" smtClean="0"/>
+              <a:rPr lang="en-US"/>
               <a:t>Fifth level</a:t>
             </a:r>
-            <a:endParaRPr lang="en-US"/>
           </a:p>
         </p:txBody>
       </p:sp>
@@ -2237,7 +2767,7 @@
           <a:p>
             <a:pPr lvl="0"/>
             <a:r>
-              <a:rPr lang="en-US" smtClean="0"/>
+              <a:rPr lang="en-US"/>
               <a:t>Click to edit Master text styles</a:t>
             </a:r>
           </a:p>
@@ -2363,10 +2893,9 @@
           </a:lstStyle>
           <a:p>
             <a:r>
-              <a:rPr lang="en-US" smtClean="0"/>
+              <a:rPr lang="en-US"/>
               <a:t>Click to edit Master title style</a:t>
             </a:r>
-            <a:endParaRPr lang="en-US"/>
           </a:p>
         </p:txBody>
       </p:sp>
@@ -2490,7 +3019,7 @@
           <a:p>
             <a:pPr lvl="0"/>
             <a:r>
-              <a:rPr lang="en-US" smtClean="0"/>
+              <a:rPr lang="en-US"/>
               <a:t>Click to edit Master text styles</a:t>
             </a:r>
           </a:p>
@@ -2622,10 +3151,9 @@
           <a:lstStyle/>
           <a:p>
             <a:r>
-              <a:rPr lang="en-US" smtClean="0"/>
+              <a:rPr lang="en-US"/>
               <a:t>Click to edit Master title style</a:t>
             </a:r>
-            <a:endParaRPr lang="en-US"/>
           </a:p>
         </p:txBody>
       </p:sp>
@@ -2656,38 +3184,37 @@
           <a:p>
             <a:pPr lvl="0"/>
             <a:r>
-              <a:rPr lang="en-US" smtClean="0"/>
+              <a:rPr lang="en-US"/>
               <a:t>Click to edit Master text styles</a:t>
             </a:r>
           </a:p>
           <a:p>
             <a:pPr lvl="1"/>
             <a:r>
-              <a:rPr lang="en-US" smtClean="0"/>
+              <a:rPr lang="en-US"/>
               <a:t>Second level</a:t>
             </a:r>
           </a:p>
           <a:p>
             <a:pPr lvl="2"/>
             <a:r>
-              <a:rPr lang="en-US" smtClean="0"/>
+              <a:rPr lang="en-US"/>
               <a:t>Third level</a:t>
             </a:r>
           </a:p>
           <a:p>
             <a:pPr lvl="3"/>
             <a:r>
-              <a:rPr lang="en-US" smtClean="0"/>
+              <a:rPr lang="en-US"/>
               <a:t>Fourth level</a:t>
             </a:r>
           </a:p>
           <a:p>
             <a:pPr lvl="4"/>
             <a:r>
-              <a:rPr lang="en-US" smtClean="0"/>
+              <a:rPr lang="en-US"/>
               <a:t>Fifth level</a:t>
             </a:r>
-            <a:endParaRPr lang="en-US"/>
           </a:p>
         </p:txBody>
       </p:sp>
@@ -3103,12 +3630,12 @@
       </p:grpSpPr>
       <p:sp>
         <p:nvSpPr>
-          <p:cNvPr id="4" name="Title 3"/>
-          <p:cNvSpPr>
-            <a:spLocks noGrp="1"/>
-          </p:cNvSpPr>
-          <p:nvPr>
-            <p:ph type="title"/>
+          <p:cNvPr id="2" name="Title 1"/>
+          <p:cNvSpPr>
+            <a:spLocks noGrp="1"/>
+          </p:cNvSpPr>
+          <p:nvPr>
+            <p:ph type="ctrTitle"/>
           </p:nvPr>
         </p:nvSpPr>
         <p:spPr/>
@@ -3119,18 +3646,1174 @@
           <a:lstStyle/>
           <a:p>
             <a:r>
-              <a:rPr lang="en-US" sz="4900" dirty="0" smtClean="0"/>
+              <a:rPr lang="en-US" dirty="0"/>
+              <a:t>Recreation of </a:t>
+            </a:r>
+            <a:r>
+              <a:rPr lang="en-US" i="1" dirty="0"/>
+              <a:t>High-Density SNP Genotyping of Tomato Reveals Patterns of Genetic Variation Due to Breeding</a:t>
+            </a:r>
+            <a:endParaRPr lang="en-US" dirty="0"/>
+          </a:p>
+        </p:txBody>
+      </p:sp>
+      <p:sp>
+        <p:nvSpPr>
+          <p:cNvPr id="3" name="Subtitle 2"/>
+          <p:cNvSpPr>
+            <a:spLocks noGrp="1"/>
+          </p:cNvSpPr>
+          <p:nvPr>
+            <p:ph type="subTitle" idx="1"/>
+          </p:nvPr>
+        </p:nvSpPr>
+        <p:spPr>
+          <a:xfrm>
+            <a:off x="1371600" y="4648200"/>
+            <a:ext cx="6400800" cy="1752600"/>
+          </a:xfrm>
+        </p:spPr>
+        <p:txBody>
+          <a:bodyPr/>
+          <a:lstStyle/>
+          <a:p>
+            <a:r>
+              <a:rPr lang="en-US" dirty="0"/>
+              <a:t>Matthew</a:t>
+            </a:r>
+          </a:p>
+        </p:txBody>
+      </p:sp>
+    </p:spTree>
+    <p:extLst>
+      <p:ext uri="{BB962C8B-B14F-4D97-AF65-F5344CB8AC3E}">
+        <p14:creationId xmlns:p14="http://schemas.microsoft.com/office/powerpoint/2010/main" val="3029685427"/>
+      </p:ext>
+    </p:extLst>
+  </p:cSld>
+  <p:clrMapOvr>
+    <a:masterClrMapping/>
+  </p:clrMapOvr>
+</p:sld>
+</file>
+
+<file path=ppt/slides/slide10.xml><?xml version="1.0" encoding="utf-8"?>
+<p:sld xmlns:a="http://schemas.openxmlformats.org/drawingml/2006/main" xmlns:r="http://schemas.openxmlformats.org/officeDocument/2006/relationships" xmlns:p="http://schemas.openxmlformats.org/presentationml/2006/main">
+  <p:cSld>
+    <p:spTree>
+      <p:nvGrpSpPr>
+        <p:cNvPr id="1" name=""/>
+        <p:cNvGrpSpPr/>
+        <p:nvPr/>
+      </p:nvGrpSpPr>
+      <p:grpSpPr>
+        <a:xfrm>
+          <a:off x="0" y="0"/>
+          <a:ext cx="0" cy="0"/>
+          <a:chOff x="0" y="0"/>
+          <a:chExt cx="0" cy="0"/>
+        </a:xfrm>
+      </p:grpSpPr>
+      <p:sp>
+        <p:nvSpPr>
+          <p:cNvPr id="2" name="Title 1"/>
+          <p:cNvSpPr>
+            <a:spLocks noGrp="1"/>
+          </p:cNvSpPr>
+          <p:nvPr>
+            <p:ph type="title"/>
+          </p:nvPr>
+        </p:nvSpPr>
+        <p:spPr/>
+        <p:txBody>
+          <a:bodyPr>
+            <a:normAutofit fontScale="90000"/>
+          </a:bodyPr>
+          <a:lstStyle/>
+          <a:p>
+            <a:r>
+              <a:rPr lang="en-US" dirty="0"/>
+              <a:t>Confirm results w/Structure Analysis:</a:t>
+            </a:r>
+            <a:br>
+              <a:rPr lang="en-US" dirty="0"/>
+            </a:br>
+            <a:r>
+              <a:rPr lang="en-US" sz="3600" dirty="0"/>
+              <a:t>Results: Full Dataset</a:t>
+            </a:r>
+          </a:p>
+        </p:txBody>
+      </p:sp>
+      <p:pic>
+        <p:nvPicPr>
+          <p:cNvPr id="2050" name="Picture 2"/>
+          <p:cNvPicPr>
+            <a:picLocks noChangeAspect="1" noChangeArrowheads="1"/>
+          </p:cNvPicPr>
+          <p:nvPr/>
+        </p:nvPicPr>
+        <p:blipFill rotWithShape="1">
+          <a:blip r:embed="rId2">
+            <a:extLst>
+              <a:ext uri="{28A0092B-C50C-407E-A947-70E740481C1C}">
+                <a14:useLocalDpi xmlns:a14="http://schemas.microsoft.com/office/drawing/2010/main" val="0"/>
+              </a:ext>
+            </a:extLst>
+          </a:blip>
+          <a:srcRect l="2869" t="11600" r="2671" b="12788"/>
+          <a:stretch/>
+        </p:blipFill>
+        <p:spPr bwMode="auto">
+          <a:xfrm>
+            <a:off x="228600" y="1600200"/>
+            <a:ext cx="8686800" cy="4921004"/>
+          </a:xfrm>
+          <a:prstGeom prst="rect">
+            <a:avLst/>
+          </a:prstGeom>
+          <a:noFill/>
+          <a:ln>
+            <a:noFill/>
+          </a:ln>
+          <a:extLst>
+            <a:ext uri="{909E8E84-426E-40DD-AFC4-6F175D3DCCD1}">
+              <a14:hiddenFill xmlns:a14="http://schemas.microsoft.com/office/drawing/2010/main">
+                <a:solidFill>
+                  <a:schemeClr val="accent1"/>
+                </a:solidFill>
+              </a14:hiddenFill>
+            </a:ext>
+            <a:ext uri="{91240B29-F687-4F45-9708-019B960494DF}">
+              <a14:hiddenLine xmlns:a14="http://schemas.microsoft.com/office/drawing/2010/main" w="9525">
+                <a:solidFill>
+                  <a:schemeClr val="tx1"/>
+                </a:solidFill>
+                <a:miter lim="800000"/>
+                <a:headEnd/>
+                <a:tailEnd/>
+              </a14:hiddenLine>
+            </a:ext>
+          </a:extLst>
+        </p:spPr>
+      </p:pic>
+    </p:spTree>
+    <p:extLst>
+      <p:ext uri="{BB962C8B-B14F-4D97-AF65-F5344CB8AC3E}">
+        <p14:creationId xmlns:p14="http://schemas.microsoft.com/office/powerpoint/2010/main" val="4103679333"/>
+      </p:ext>
+    </p:extLst>
+  </p:cSld>
+  <p:clrMapOvr>
+    <a:masterClrMapping/>
+  </p:clrMapOvr>
+</p:sld>
+</file>
+
+<file path=ppt/slides/slide11.xml><?xml version="1.0" encoding="utf-8"?>
+<p:sld xmlns:a="http://schemas.openxmlformats.org/drawingml/2006/main" xmlns:r="http://schemas.openxmlformats.org/officeDocument/2006/relationships" xmlns:p="http://schemas.openxmlformats.org/presentationml/2006/main">
+  <p:cSld>
+    <p:spTree>
+      <p:nvGrpSpPr>
+        <p:cNvPr id="1" name=""/>
+        <p:cNvGrpSpPr/>
+        <p:nvPr/>
+      </p:nvGrpSpPr>
+      <p:grpSpPr>
+        <a:xfrm>
+          <a:off x="0" y="0"/>
+          <a:ext cx="0" cy="0"/>
+          <a:chOff x="0" y="0"/>
+          <a:chExt cx="0" cy="0"/>
+        </a:xfrm>
+      </p:grpSpPr>
+      <p:sp>
+        <p:nvSpPr>
+          <p:cNvPr id="2" name="Title 1"/>
+          <p:cNvSpPr>
+            <a:spLocks noGrp="1"/>
+          </p:cNvSpPr>
+          <p:nvPr>
+            <p:ph type="title"/>
+          </p:nvPr>
+        </p:nvSpPr>
+        <p:spPr/>
+        <p:txBody>
+          <a:bodyPr>
+            <a:normAutofit fontScale="90000"/>
+          </a:bodyPr>
+          <a:lstStyle/>
+          <a:p>
+            <a:r>
+              <a:rPr lang="en-US" dirty="0"/>
+              <a:t>Confirm results w/Structure Analysis:</a:t>
+            </a:r>
+            <a:br>
+              <a:rPr lang="en-US" dirty="0"/>
+            </a:br>
+            <a:r>
+              <a:rPr lang="en-US" sz="3600" dirty="0"/>
+              <a:t>Results: Full Dataset</a:t>
+            </a:r>
+            <a:endParaRPr lang="en-US" dirty="0"/>
+          </a:p>
+        </p:txBody>
+      </p:sp>
+      <p:pic>
+        <p:nvPicPr>
+          <p:cNvPr id="3074" name="Picture 2"/>
+          <p:cNvPicPr>
+            <a:picLocks noChangeAspect="1" noChangeArrowheads="1"/>
+          </p:cNvPicPr>
+          <p:nvPr/>
+        </p:nvPicPr>
+        <p:blipFill rotWithShape="1">
+          <a:blip r:embed="rId2">
+            <a:extLst>
+              <a:ext uri="{28A0092B-C50C-407E-A947-70E740481C1C}">
+                <a14:useLocalDpi xmlns:a14="http://schemas.microsoft.com/office/drawing/2010/main" val="0"/>
+              </a:ext>
+            </a:extLst>
+          </a:blip>
+          <a:srcRect l="3363" t="11461" r="2671" b="12369"/>
+          <a:stretch/>
+        </p:blipFill>
+        <p:spPr bwMode="auto">
+          <a:xfrm>
+            <a:off x="284387" y="1600200"/>
+            <a:ext cx="8575226" cy="4919472"/>
+          </a:xfrm>
+          <a:prstGeom prst="rect">
+            <a:avLst/>
+          </a:prstGeom>
+          <a:noFill/>
+          <a:ln>
+            <a:noFill/>
+          </a:ln>
+          <a:extLst>
+            <a:ext uri="{909E8E84-426E-40DD-AFC4-6F175D3DCCD1}">
+              <a14:hiddenFill xmlns:a14="http://schemas.microsoft.com/office/drawing/2010/main">
+                <a:solidFill>
+                  <a:schemeClr val="accent1"/>
+                </a:solidFill>
+              </a14:hiddenFill>
+            </a:ext>
+            <a:ext uri="{91240B29-F687-4F45-9708-019B960494DF}">
+              <a14:hiddenLine xmlns:a14="http://schemas.microsoft.com/office/drawing/2010/main" w="9525">
+                <a:solidFill>
+                  <a:schemeClr val="tx1"/>
+                </a:solidFill>
+                <a:miter lim="800000"/>
+                <a:headEnd/>
+                <a:tailEnd/>
+              </a14:hiddenLine>
+            </a:ext>
+          </a:extLst>
+        </p:spPr>
+      </p:pic>
+    </p:spTree>
+    <p:extLst>
+      <p:ext uri="{BB962C8B-B14F-4D97-AF65-F5344CB8AC3E}">
+        <p14:creationId xmlns:p14="http://schemas.microsoft.com/office/powerpoint/2010/main" val="4023083018"/>
+      </p:ext>
+    </p:extLst>
+  </p:cSld>
+  <p:clrMapOvr>
+    <a:masterClrMapping/>
+  </p:clrMapOvr>
+</p:sld>
+</file>
+
+<file path=ppt/slides/slide12.xml><?xml version="1.0" encoding="utf-8"?>
+<p:sld xmlns:a="http://schemas.openxmlformats.org/drawingml/2006/main" xmlns:r="http://schemas.openxmlformats.org/officeDocument/2006/relationships" xmlns:p="http://schemas.openxmlformats.org/presentationml/2006/main">
+  <p:cSld>
+    <p:spTree>
+      <p:nvGrpSpPr>
+        <p:cNvPr id="1" name=""/>
+        <p:cNvGrpSpPr/>
+        <p:nvPr/>
+      </p:nvGrpSpPr>
+      <p:grpSpPr>
+        <a:xfrm>
+          <a:off x="0" y="0"/>
+          <a:ext cx="0" cy="0"/>
+          <a:chOff x="0" y="0"/>
+          <a:chExt cx="0" cy="0"/>
+        </a:xfrm>
+      </p:grpSpPr>
+      <p:sp>
+        <p:nvSpPr>
+          <p:cNvPr id="2" name="Title 1"/>
+          <p:cNvSpPr>
+            <a:spLocks noGrp="1"/>
+          </p:cNvSpPr>
+          <p:nvPr>
+            <p:ph type="title"/>
+          </p:nvPr>
+        </p:nvSpPr>
+        <p:spPr/>
+        <p:txBody>
+          <a:bodyPr>
+            <a:normAutofit fontScale="90000"/>
+          </a:bodyPr>
+          <a:lstStyle/>
+          <a:p>
+            <a:r>
+              <a:rPr lang="en-US" dirty="0"/>
+              <a:t>Confirm results w/Structure Analysis:</a:t>
+            </a:r>
+            <a:br>
+              <a:rPr lang="en-US" dirty="0"/>
+            </a:br>
+            <a:r>
+              <a:rPr lang="en-US" sz="3600" dirty="0"/>
+              <a:t>Results: Full Dataset</a:t>
+            </a:r>
+            <a:endParaRPr lang="en-US" dirty="0"/>
+          </a:p>
+        </p:txBody>
+      </p:sp>
+      <p:pic>
+        <p:nvPicPr>
+          <p:cNvPr id="4098" name="Picture 2"/>
+          <p:cNvPicPr>
+            <a:picLocks noChangeAspect="1" noChangeArrowheads="1"/>
+          </p:cNvPicPr>
+          <p:nvPr/>
+        </p:nvPicPr>
+        <p:blipFill rotWithShape="1">
+          <a:blip r:embed="rId2">
+            <a:extLst>
+              <a:ext uri="{28A0092B-C50C-407E-A947-70E740481C1C}">
+                <a14:useLocalDpi xmlns:a14="http://schemas.microsoft.com/office/drawing/2010/main" val="0"/>
+              </a:ext>
+            </a:extLst>
+          </a:blip>
+          <a:srcRect l="3264" t="2795" r="3659" b="3845"/>
+          <a:stretch/>
+        </p:blipFill>
+        <p:spPr bwMode="auto">
+          <a:xfrm>
+            <a:off x="800100" y="1447800"/>
+            <a:ext cx="7543800" cy="5355216"/>
+          </a:xfrm>
+          <a:prstGeom prst="rect">
+            <a:avLst/>
+          </a:prstGeom>
+          <a:noFill/>
+          <a:ln>
+            <a:noFill/>
+          </a:ln>
+          <a:extLst>
+            <a:ext uri="{909E8E84-426E-40DD-AFC4-6F175D3DCCD1}">
+              <a14:hiddenFill xmlns:a14="http://schemas.microsoft.com/office/drawing/2010/main">
+                <a:solidFill>
+                  <a:schemeClr val="accent1"/>
+                </a:solidFill>
+              </a14:hiddenFill>
+            </a:ext>
+            <a:ext uri="{91240B29-F687-4F45-9708-019B960494DF}">
+              <a14:hiddenLine xmlns:a14="http://schemas.microsoft.com/office/drawing/2010/main" w="9525">
+                <a:solidFill>
+                  <a:schemeClr val="tx1"/>
+                </a:solidFill>
+                <a:miter lim="800000"/>
+                <a:headEnd/>
+                <a:tailEnd/>
+              </a14:hiddenLine>
+            </a:ext>
+          </a:extLst>
+        </p:spPr>
+      </p:pic>
+    </p:spTree>
+    <p:extLst>
+      <p:ext uri="{BB962C8B-B14F-4D97-AF65-F5344CB8AC3E}">
+        <p14:creationId xmlns:p14="http://schemas.microsoft.com/office/powerpoint/2010/main" val="347851081"/>
+      </p:ext>
+    </p:extLst>
+  </p:cSld>
+  <p:clrMapOvr>
+    <a:masterClrMapping/>
+  </p:clrMapOvr>
+</p:sld>
+</file>
+
+<file path=ppt/slides/slide13.xml><?xml version="1.0" encoding="utf-8"?>
+<p:sld xmlns:a="http://schemas.openxmlformats.org/drawingml/2006/main" xmlns:r="http://schemas.openxmlformats.org/officeDocument/2006/relationships" xmlns:p="http://schemas.openxmlformats.org/presentationml/2006/main">
+  <p:cSld>
+    <p:spTree>
+      <p:nvGrpSpPr>
+        <p:cNvPr id="1" name=""/>
+        <p:cNvGrpSpPr/>
+        <p:nvPr/>
+      </p:nvGrpSpPr>
+      <p:grpSpPr>
+        <a:xfrm>
+          <a:off x="0" y="0"/>
+          <a:ext cx="0" cy="0"/>
+          <a:chOff x="0" y="0"/>
+          <a:chExt cx="0" cy="0"/>
+        </a:xfrm>
+      </p:grpSpPr>
+      <p:sp>
+        <p:nvSpPr>
+          <p:cNvPr id="2" name="Title 1"/>
+          <p:cNvSpPr>
+            <a:spLocks noGrp="1"/>
+          </p:cNvSpPr>
+          <p:nvPr>
+            <p:ph type="title"/>
+          </p:nvPr>
+        </p:nvSpPr>
+        <p:spPr/>
+        <p:txBody>
+          <a:bodyPr>
+            <a:normAutofit fontScale="90000"/>
+          </a:bodyPr>
+          <a:lstStyle/>
+          <a:p>
+            <a:r>
+              <a:rPr lang="en-US" dirty="0"/>
+              <a:t>Confirm results w/Structure Analysis:</a:t>
+            </a:r>
+            <a:br>
+              <a:rPr lang="en-US" dirty="0"/>
+            </a:br>
+            <a:r>
+              <a:rPr lang="en-US" sz="3600" dirty="0"/>
+              <a:t>Results: Processing Dataset</a:t>
+            </a:r>
+            <a:endParaRPr lang="en-US" dirty="0"/>
+          </a:p>
+        </p:txBody>
+      </p:sp>
+      <p:pic>
+        <p:nvPicPr>
+          <p:cNvPr id="6146" name="Picture 2"/>
+          <p:cNvPicPr>
+            <a:picLocks noChangeAspect="1" noChangeArrowheads="1"/>
+          </p:cNvPicPr>
+          <p:nvPr/>
+        </p:nvPicPr>
+        <p:blipFill rotWithShape="1">
+          <a:blip r:embed="rId2">
+            <a:extLst>
+              <a:ext uri="{28A0092B-C50C-407E-A947-70E740481C1C}">
+                <a14:useLocalDpi xmlns:a14="http://schemas.microsoft.com/office/drawing/2010/main" val="0"/>
+              </a:ext>
+            </a:extLst>
+          </a:blip>
+          <a:srcRect l="9199" t="2796" r="6528" b="4262"/>
+          <a:stretch/>
+        </p:blipFill>
+        <p:spPr bwMode="auto">
+          <a:xfrm>
+            <a:off x="1156865" y="1501462"/>
+            <a:ext cx="6830270" cy="5331138"/>
+          </a:xfrm>
+          <a:prstGeom prst="rect">
+            <a:avLst/>
+          </a:prstGeom>
+          <a:noFill/>
+          <a:ln>
+            <a:noFill/>
+          </a:ln>
+          <a:extLst>
+            <a:ext uri="{909E8E84-426E-40DD-AFC4-6F175D3DCCD1}">
+              <a14:hiddenFill xmlns:a14="http://schemas.microsoft.com/office/drawing/2010/main">
+                <a:solidFill>
+                  <a:schemeClr val="accent1"/>
+                </a:solidFill>
+              </a14:hiddenFill>
+            </a:ext>
+            <a:ext uri="{91240B29-F687-4F45-9708-019B960494DF}">
+              <a14:hiddenLine xmlns:a14="http://schemas.microsoft.com/office/drawing/2010/main" w="9525">
+                <a:solidFill>
+                  <a:schemeClr val="tx1"/>
+                </a:solidFill>
+                <a:miter lim="800000"/>
+                <a:headEnd/>
+                <a:tailEnd/>
+              </a14:hiddenLine>
+            </a:ext>
+          </a:extLst>
+        </p:spPr>
+      </p:pic>
+    </p:spTree>
+    <p:extLst>
+      <p:ext uri="{BB962C8B-B14F-4D97-AF65-F5344CB8AC3E}">
+        <p14:creationId xmlns:p14="http://schemas.microsoft.com/office/powerpoint/2010/main" val="1833174166"/>
+      </p:ext>
+    </p:extLst>
+  </p:cSld>
+  <p:clrMapOvr>
+    <a:masterClrMapping/>
+  </p:clrMapOvr>
+</p:sld>
+</file>
+
+<file path=ppt/slides/slide2.xml><?xml version="1.0" encoding="utf-8"?>
+<p:sld xmlns:a="http://schemas.openxmlformats.org/drawingml/2006/main" xmlns:r="http://schemas.openxmlformats.org/officeDocument/2006/relationships" xmlns:p="http://schemas.openxmlformats.org/presentationml/2006/main">
+  <p:cSld>
+    <p:spTree>
+      <p:nvGrpSpPr>
+        <p:cNvPr id="1" name=""/>
+        <p:cNvGrpSpPr/>
+        <p:nvPr/>
+      </p:nvGrpSpPr>
+      <p:grpSpPr>
+        <a:xfrm>
+          <a:off x="0" y="0"/>
+          <a:ext cx="0" cy="0"/>
+          <a:chOff x="0" y="0"/>
+          <a:chExt cx="0" cy="0"/>
+        </a:xfrm>
+      </p:grpSpPr>
+      <p:sp>
+        <p:nvSpPr>
+          <p:cNvPr id="2" name="Title 1"/>
+          <p:cNvSpPr>
+            <a:spLocks noGrp="1"/>
+          </p:cNvSpPr>
+          <p:nvPr>
+            <p:ph type="title"/>
+          </p:nvPr>
+        </p:nvSpPr>
+        <p:spPr/>
+        <p:txBody>
+          <a:bodyPr/>
+          <a:lstStyle/>
+          <a:p>
+            <a:r>
+              <a:rPr lang="en-US" dirty="0"/>
+              <a:t>Introduction</a:t>
+            </a:r>
+          </a:p>
+        </p:txBody>
+      </p:sp>
+      <p:sp>
+        <p:nvSpPr>
+          <p:cNvPr id="3" name="Content Placeholder 2"/>
+          <p:cNvSpPr>
+            <a:spLocks noGrp="1"/>
+          </p:cNvSpPr>
+          <p:nvPr>
+            <p:ph idx="1"/>
+          </p:nvPr>
+        </p:nvSpPr>
+        <p:spPr/>
+        <p:txBody>
+          <a:bodyPr>
+            <a:normAutofit lnSpcReduction="10000"/>
+          </a:bodyPr>
+          <a:lstStyle/>
+          <a:p>
+            <a:r>
+              <a:rPr lang="en-US" dirty="0"/>
+              <a:t>Array-based genotyping platforms permit rapid scoring of several thousand markers in parallel</a:t>
+            </a:r>
+          </a:p>
+          <a:p>
+            <a:r>
+              <a:rPr lang="en-US" dirty="0"/>
+              <a:t>Maize array </a:t>
+            </a:r>
+            <a:r>
+              <a:rPr lang="en-US" dirty="0">
+                <a:sym typeface="Wingdings" panose="05000000000000000000" pitchFamily="2" charset="2"/>
+              </a:rPr>
+              <a:t> 49,585 SNPs produced two genetic linkage maps with 20,913 and 14,524 markers, respectively</a:t>
+            </a:r>
+          </a:p>
+          <a:p>
+            <a:r>
+              <a:rPr lang="en-US" dirty="0" err="1">
+                <a:sym typeface="Wingdings" panose="05000000000000000000" pitchFamily="2" charset="2"/>
+              </a:rPr>
+              <a:t>SolCAP</a:t>
+            </a:r>
+            <a:r>
+              <a:rPr lang="en-US" dirty="0">
+                <a:sym typeface="Wingdings" panose="05000000000000000000" pitchFamily="2" charset="2"/>
+              </a:rPr>
+              <a:t> array  7,720 SNPs produced 3,503 markers in EXPEN 2000 and 4,491 markers in EXPIM 2012</a:t>
+            </a:r>
+            <a:endParaRPr lang="en-US" dirty="0"/>
+          </a:p>
+        </p:txBody>
+      </p:sp>
+    </p:spTree>
+    <p:extLst>
+      <p:ext uri="{BB962C8B-B14F-4D97-AF65-F5344CB8AC3E}">
+        <p14:creationId xmlns:p14="http://schemas.microsoft.com/office/powerpoint/2010/main" val="3390068481"/>
+      </p:ext>
+    </p:extLst>
+  </p:cSld>
+  <p:clrMapOvr>
+    <a:masterClrMapping/>
+  </p:clrMapOvr>
+</p:sld>
+</file>
+
+<file path=ppt/slides/slide3.xml><?xml version="1.0" encoding="utf-8"?>
+<p:sld xmlns:a="http://schemas.openxmlformats.org/drawingml/2006/main" xmlns:r="http://schemas.openxmlformats.org/officeDocument/2006/relationships" xmlns:p="http://schemas.openxmlformats.org/presentationml/2006/main">
+  <p:cSld>
+    <p:spTree>
+      <p:nvGrpSpPr>
+        <p:cNvPr id="1" name=""/>
+        <p:cNvGrpSpPr/>
+        <p:nvPr/>
+      </p:nvGrpSpPr>
+      <p:grpSpPr>
+        <a:xfrm>
+          <a:off x="0" y="0"/>
+          <a:ext cx="0" cy="0"/>
+          <a:chOff x="0" y="0"/>
+          <a:chExt cx="0" cy="0"/>
+        </a:xfrm>
+      </p:grpSpPr>
+      <p:sp>
+        <p:nvSpPr>
+          <p:cNvPr id="2" name="Title 1"/>
+          <p:cNvSpPr>
+            <a:spLocks noGrp="1"/>
+          </p:cNvSpPr>
+          <p:nvPr>
+            <p:ph type="title"/>
+          </p:nvPr>
+        </p:nvSpPr>
+        <p:spPr/>
+        <p:txBody>
+          <a:bodyPr/>
+          <a:lstStyle/>
+          <a:p>
+            <a:r>
+              <a:rPr lang="en-US" dirty="0"/>
+              <a:t>Fresh Market &amp; Processing Grape</a:t>
+            </a:r>
+          </a:p>
+        </p:txBody>
+      </p:sp>
+      <p:pic>
+        <p:nvPicPr>
+          <p:cNvPr id="5" name="Content Placeholder 4"/>
+          <p:cNvPicPr>
+            <a:picLocks noGrp="1" noChangeAspect="1"/>
+          </p:cNvPicPr>
+          <p:nvPr>
+            <p:ph idx="1"/>
+          </p:nvPr>
+        </p:nvPicPr>
+        <p:blipFill>
+          <a:blip r:embed="rId3" cstate="print">
+            <a:extLst>
+              <a:ext uri="{28A0092B-C50C-407E-A947-70E740481C1C}">
+                <a14:useLocalDpi xmlns:a14="http://schemas.microsoft.com/office/drawing/2010/main" val="0"/>
+              </a:ext>
+            </a:extLst>
+          </a:blip>
+          <a:stretch>
+            <a:fillRect/>
+          </a:stretch>
+        </p:blipFill>
+        <p:spPr>
+          <a:xfrm>
+            <a:off x="838200" y="2684670"/>
+            <a:ext cx="2935196" cy="3915990"/>
+          </a:xfrm>
+        </p:spPr>
+      </p:pic>
+      <p:pic>
+        <p:nvPicPr>
+          <p:cNvPr id="8" name="Picture 7"/>
+          <p:cNvPicPr>
+            <a:picLocks noChangeAspect="1"/>
+          </p:cNvPicPr>
+          <p:nvPr/>
+        </p:nvPicPr>
+        <p:blipFill>
+          <a:blip r:embed="rId4" cstate="print">
+            <a:extLst>
+              <a:ext uri="{28A0092B-C50C-407E-A947-70E740481C1C}">
+                <a14:useLocalDpi xmlns:a14="http://schemas.microsoft.com/office/drawing/2010/main" val="0"/>
+              </a:ext>
+            </a:extLst>
+          </a:blip>
+          <a:stretch>
+            <a:fillRect/>
+          </a:stretch>
+        </p:blipFill>
+        <p:spPr>
+          <a:xfrm>
+            <a:off x="5486400" y="2993860"/>
+            <a:ext cx="2705100" cy="3606800"/>
+          </a:xfrm>
+          <a:prstGeom prst="rect">
+            <a:avLst/>
+          </a:prstGeom>
+        </p:spPr>
+      </p:pic>
+      <p:sp>
+        <p:nvSpPr>
+          <p:cNvPr id="10" name="TextBox 9"/>
+          <p:cNvSpPr txBox="1"/>
+          <p:nvPr/>
+        </p:nvSpPr>
+        <p:spPr>
+          <a:xfrm>
+            <a:off x="1295400" y="1559417"/>
+            <a:ext cx="6553200" cy="646331"/>
+          </a:xfrm>
+          <a:prstGeom prst="rect">
+            <a:avLst/>
+          </a:prstGeom>
+          <a:noFill/>
+        </p:spPr>
+        <p:txBody>
+          <a:bodyPr wrap="square" rtlCol="0">
+            <a:spAutoFit/>
+          </a:bodyPr>
+          <a:lstStyle/>
+          <a:p>
+            <a:pPr algn="ctr"/>
+            <a:r>
+              <a:rPr lang="en-US" dirty="0"/>
+              <a:t>Breeding for distinct market classes has led to genetic differentiation in contemporary germplasm</a:t>
+            </a:r>
+          </a:p>
+        </p:txBody>
+      </p:sp>
+    </p:spTree>
+    <p:extLst>
+      <p:ext uri="{BB962C8B-B14F-4D97-AF65-F5344CB8AC3E}">
+        <p14:creationId xmlns:p14="http://schemas.microsoft.com/office/powerpoint/2010/main" val="3374999697"/>
+      </p:ext>
+    </p:extLst>
+  </p:cSld>
+  <p:clrMapOvr>
+    <a:masterClrMapping/>
+  </p:clrMapOvr>
+</p:sld>
+</file>
+
+<file path=ppt/slides/slide4.xml><?xml version="1.0" encoding="utf-8"?>
+<p:sld xmlns:a="http://schemas.openxmlformats.org/drawingml/2006/main" xmlns:r="http://schemas.openxmlformats.org/officeDocument/2006/relationships" xmlns:p="http://schemas.openxmlformats.org/presentationml/2006/main">
+  <p:cSld>
+    <p:spTree>
+      <p:nvGrpSpPr>
+        <p:cNvPr id="1" name=""/>
+        <p:cNvGrpSpPr/>
+        <p:nvPr/>
+      </p:nvGrpSpPr>
+      <p:grpSpPr>
+        <a:xfrm>
+          <a:off x="0" y="0"/>
+          <a:ext cx="0" cy="0"/>
+          <a:chOff x="0" y="0"/>
+          <a:chExt cx="0" cy="0"/>
+        </a:xfrm>
+      </p:grpSpPr>
+      <p:sp>
+        <p:nvSpPr>
+          <p:cNvPr id="2" name="Title 1"/>
+          <p:cNvSpPr>
+            <a:spLocks noGrp="1"/>
+          </p:cNvSpPr>
+          <p:nvPr>
+            <p:ph type="title"/>
+          </p:nvPr>
+        </p:nvSpPr>
+        <p:spPr/>
+        <p:txBody>
+          <a:bodyPr/>
+          <a:lstStyle/>
+          <a:p>
+            <a:r>
+              <a:rPr lang="en-US" dirty="0"/>
+              <a:t>Multi</a:t>
+            </a:r>
+          </a:p>
+        </p:txBody>
+      </p:sp>
+      <p:pic>
+        <p:nvPicPr>
+          <p:cNvPr id="5" name="Content Placeholder 4"/>
+          <p:cNvPicPr>
+            <a:picLocks noGrp="1" noChangeAspect="1"/>
+          </p:cNvPicPr>
+          <p:nvPr>
+            <p:ph idx="1"/>
+          </p:nvPr>
+        </p:nvPicPr>
+        <p:blipFill>
+          <a:blip r:embed="rId2" cstate="print">
+            <a:extLst>
+              <a:ext uri="{28A0092B-C50C-407E-A947-70E740481C1C}">
+                <a14:useLocalDpi xmlns:a14="http://schemas.microsoft.com/office/drawing/2010/main" val="0"/>
+              </a:ext>
+            </a:extLst>
+          </a:blip>
+          <a:stretch>
+            <a:fillRect/>
+          </a:stretch>
+        </p:blipFill>
+        <p:spPr>
+          <a:xfrm>
+            <a:off x="685799" y="1704815"/>
+            <a:ext cx="3213313" cy="2409985"/>
+          </a:xfrm>
+        </p:spPr>
+      </p:pic>
+      <p:pic>
+        <p:nvPicPr>
+          <p:cNvPr id="8" name="Content Placeholder 8"/>
+          <p:cNvPicPr>
+            <a:picLocks noChangeAspect="1"/>
+          </p:cNvPicPr>
+          <p:nvPr/>
+        </p:nvPicPr>
+        <p:blipFill>
+          <a:blip r:embed="rId3" cstate="print">
+            <a:extLst>
+              <a:ext uri="{28A0092B-C50C-407E-A947-70E740481C1C}">
+                <a14:useLocalDpi xmlns:a14="http://schemas.microsoft.com/office/drawing/2010/main" val="0"/>
+              </a:ext>
+            </a:extLst>
+          </a:blip>
+          <a:stretch>
+            <a:fillRect/>
+          </a:stretch>
+        </p:blipFill>
+        <p:spPr>
+          <a:xfrm>
+            <a:off x="609599" y="4280338"/>
+            <a:ext cx="3180721" cy="2385541"/>
+          </a:xfrm>
+          <a:prstGeom prst="rect">
+            <a:avLst/>
+          </a:prstGeom>
+        </p:spPr>
+      </p:pic>
+      <p:pic>
+        <p:nvPicPr>
+          <p:cNvPr id="14" name="Picture 13"/>
+          <p:cNvPicPr>
+            <a:picLocks noChangeAspect="1"/>
+          </p:cNvPicPr>
+          <p:nvPr/>
+        </p:nvPicPr>
+        <p:blipFill rotWithShape="1">
+          <a:blip r:embed="rId4" cstate="print">
+            <a:extLst>
+              <a:ext uri="{28A0092B-C50C-407E-A947-70E740481C1C}">
+                <a14:useLocalDpi xmlns:a14="http://schemas.microsoft.com/office/drawing/2010/main" val="0"/>
+              </a:ext>
+            </a:extLst>
+          </a:blip>
+          <a:srcRect l="12222" t="27778" r="6227"/>
+          <a:stretch/>
+        </p:blipFill>
+        <p:spPr>
+          <a:xfrm rot="5400000">
+            <a:off x="4078524" y="2535795"/>
+            <a:ext cx="4754562" cy="3158011"/>
+          </a:xfrm>
+          <a:prstGeom prst="rect">
+            <a:avLst/>
+          </a:prstGeom>
+        </p:spPr>
+      </p:pic>
+    </p:spTree>
+    <p:extLst>
+      <p:ext uri="{BB962C8B-B14F-4D97-AF65-F5344CB8AC3E}">
+        <p14:creationId xmlns:p14="http://schemas.microsoft.com/office/powerpoint/2010/main" val="3251311926"/>
+      </p:ext>
+    </p:extLst>
+  </p:cSld>
+  <p:clrMapOvr>
+    <a:masterClrMapping/>
+  </p:clrMapOvr>
+</p:sld>
+</file>
+
+<file path=ppt/slides/slide5.xml><?xml version="1.0" encoding="utf-8"?>
+<p:sld xmlns:a="http://schemas.openxmlformats.org/drawingml/2006/main" xmlns:r="http://schemas.openxmlformats.org/officeDocument/2006/relationships" xmlns:p="http://schemas.openxmlformats.org/presentationml/2006/main">
+  <p:cSld>
+    <p:spTree>
+      <p:nvGrpSpPr>
+        <p:cNvPr id="1" name=""/>
+        <p:cNvGrpSpPr/>
+        <p:nvPr/>
+      </p:nvGrpSpPr>
+      <p:grpSpPr>
+        <a:xfrm>
+          <a:off x="0" y="0"/>
+          <a:ext cx="0" cy="0"/>
+          <a:chOff x="0" y="0"/>
+          <a:chExt cx="0" cy="0"/>
+        </a:xfrm>
+      </p:grpSpPr>
+      <p:sp>
+        <p:nvSpPr>
+          <p:cNvPr id="2" name="Title 1"/>
+          <p:cNvSpPr>
+            <a:spLocks noGrp="1"/>
+          </p:cNvSpPr>
+          <p:nvPr>
+            <p:ph type="title"/>
+          </p:nvPr>
+        </p:nvSpPr>
+        <p:spPr/>
+        <p:txBody>
+          <a:bodyPr/>
+          <a:lstStyle/>
+          <a:p>
+            <a:r>
+              <a:rPr lang="en-US" dirty="0"/>
+              <a:t>Retros</a:t>
+            </a:r>
+          </a:p>
+        </p:txBody>
+      </p:sp>
+      <p:pic>
+        <p:nvPicPr>
+          <p:cNvPr id="5" name="Content Placeholder 4"/>
+          <p:cNvPicPr>
+            <a:picLocks noGrp="1" noChangeAspect="1"/>
+          </p:cNvPicPr>
+          <p:nvPr>
+            <p:ph idx="1"/>
+          </p:nvPr>
+        </p:nvPicPr>
+        <p:blipFill>
+          <a:blip r:embed="rId2" cstate="print">
+            <a:extLst>
+              <a:ext uri="{28A0092B-C50C-407E-A947-70E740481C1C}">
+                <a14:useLocalDpi xmlns:a14="http://schemas.microsoft.com/office/drawing/2010/main" val="0"/>
+              </a:ext>
+            </a:extLst>
+          </a:blip>
+          <a:stretch>
+            <a:fillRect/>
+          </a:stretch>
+        </p:blipFill>
+        <p:spPr>
+          <a:xfrm>
+            <a:off x="491359" y="2286000"/>
+            <a:ext cx="2514600" cy="3352800"/>
+          </a:xfrm>
+        </p:spPr>
+      </p:pic>
+      <p:pic>
+        <p:nvPicPr>
+          <p:cNvPr id="7" name="Picture 6"/>
+          <p:cNvPicPr>
+            <a:picLocks noChangeAspect="1"/>
+          </p:cNvPicPr>
+          <p:nvPr/>
+        </p:nvPicPr>
+        <p:blipFill>
+          <a:blip r:embed="rId3" cstate="print">
+            <a:extLst>
+              <a:ext uri="{28A0092B-C50C-407E-A947-70E740481C1C}">
+                <a14:useLocalDpi xmlns:a14="http://schemas.microsoft.com/office/drawing/2010/main" val="0"/>
+              </a:ext>
+            </a:extLst>
+          </a:blip>
+          <a:stretch>
+            <a:fillRect/>
+          </a:stretch>
+        </p:blipFill>
+        <p:spPr>
+          <a:xfrm>
+            <a:off x="3385460" y="2286000"/>
+            <a:ext cx="2625329" cy="3500438"/>
+          </a:xfrm>
+          <a:prstGeom prst="rect">
+            <a:avLst/>
+          </a:prstGeom>
+        </p:spPr>
+      </p:pic>
+      <p:pic>
+        <p:nvPicPr>
+          <p:cNvPr id="8" name="Content Placeholder 12"/>
+          <p:cNvPicPr>
+            <a:picLocks noChangeAspect="1"/>
+          </p:cNvPicPr>
+          <p:nvPr/>
+        </p:nvPicPr>
+        <p:blipFill>
+          <a:blip r:embed="rId4" cstate="print">
+            <a:extLst>
+              <a:ext uri="{28A0092B-C50C-407E-A947-70E740481C1C}">
+                <a14:useLocalDpi xmlns:a14="http://schemas.microsoft.com/office/drawing/2010/main" val="0"/>
+              </a:ext>
+            </a:extLst>
+          </a:blip>
+          <a:stretch>
+            <a:fillRect/>
+          </a:stretch>
+        </p:blipFill>
+        <p:spPr>
+          <a:xfrm>
+            <a:off x="6385035" y="2281238"/>
+            <a:ext cx="2628900" cy="3505200"/>
+          </a:xfrm>
+          <a:prstGeom prst="rect">
+            <a:avLst/>
+          </a:prstGeom>
+        </p:spPr>
+      </p:pic>
+    </p:spTree>
+    <p:extLst>
+      <p:ext uri="{BB962C8B-B14F-4D97-AF65-F5344CB8AC3E}">
+        <p14:creationId xmlns:p14="http://schemas.microsoft.com/office/powerpoint/2010/main" val="2195874121"/>
+      </p:ext>
+    </p:extLst>
+  </p:cSld>
+  <p:clrMapOvr>
+    <a:masterClrMapping/>
+  </p:clrMapOvr>
+</p:sld>
+</file>
+
+<file path=ppt/slides/slide6.xml><?xml version="1.0" encoding="utf-8"?>
+<p:sld xmlns:a="http://schemas.openxmlformats.org/drawingml/2006/main" xmlns:r="http://schemas.openxmlformats.org/officeDocument/2006/relationships" xmlns:p="http://schemas.openxmlformats.org/presentationml/2006/main">
+  <p:cSld>
+    <p:spTree>
+      <p:nvGrpSpPr>
+        <p:cNvPr id="1" name=""/>
+        <p:cNvGrpSpPr/>
+        <p:nvPr/>
+      </p:nvGrpSpPr>
+      <p:grpSpPr>
+        <a:xfrm>
+          <a:off x="0" y="0"/>
+          <a:ext cx="0" cy="0"/>
+          <a:chOff x="0" y="0"/>
+          <a:chExt cx="0" cy="0"/>
+        </a:xfrm>
+      </p:grpSpPr>
+      <p:sp>
+        <p:nvSpPr>
+          <p:cNvPr id="2" name="Title 1"/>
+          <p:cNvSpPr>
+            <a:spLocks noGrp="1"/>
+          </p:cNvSpPr>
+          <p:nvPr>
+            <p:ph type="title"/>
+          </p:nvPr>
+        </p:nvSpPr>
+        <p:spPr/>
+        <p:txBody>
+          <a:bodyPr/>
+          <a:lstStyle/>
+          <a:p>
+            <a:r>
+              <a:rPr lang="en-US" dirty="0"/>
+              <a:t>Objectives</a:t>
+            </a:r>
+          </a:p>
+        </p:txBody>
+      </p:sp>
+      <p:sp>
+        <p:nvSpPr>
+          <p:cNvPr id="3" name="Content Placeholder 2"/>
+          <p:cNvSpPr>
+            <a:spLocks noGrp="1"/>
+          </p:cNvSpPr>
+          <p:nvPr>
+            <p:ph idx="1"/>
+          </p:nvPr>
+        </p:nvSpPr>
+        <p:spPr/>
+        <p:txBody>
+          <a:bodyPr>
+            <a:normAutofit fontScale="92500"/>
+          </a:bodyPr>
+          <a:lstStyle/>
+          <a:p>
+            <a:r>
+              <a:rPr lang="en-US" dirty="0"/>
+              <a:t>Investigate genetic variation on the tomato genome due to contemporary breeding</a:t>
+            </a:r>
+          </a:p>
+          <a:p>
+            <a:r>
+              <a:rPr lang="en-US" dirty="0"/>
+              <a:t>Conduct population level analysis based on the germplasm panel</a:t>
+            </a:r>
+          </a:p>
+          <a:p>
+            <a:r>
+              <a:rPr lang="en-US" dirty="0"/>
+              <a:t>Identify sub-populations by analyzing SNP genotypes from the array</a:t>
+            </a:r>
+          </a:p>
+          <a:p>
+            <a:r>
+              <a:rPr lang="en-US" dirty="0"/>
+              <a:t>Investigate patterns of linkage disequilibrium (LD) within each chromosome in three subpopulations (processing, fresh market, and vintage)</a:t>
+            </a:r>
+          </a:p>
+        </p:txBody>
+      </p:sp>
+    </p:spTree>
+    <p:extLst>
+      <p:ext uri="{BB962C8B-B14F-4D97-AF65-F5344CB8AC3E}">
+        <p14:creationId xmlns:p14="http://schemas.microsoft.com/office/powerpoint/2010/main" val="3699667264"/>
+      </p:ext>
+    </p:extLst>
+  </p:cSld>
+  <p:clrMapOvr>
+    <a:masterClrMapping/>
+  </p:clrMapOvr>
+</p:sld>
+</file>
+
+<file path=ppt/slides/slide7.xml><?xml version="1.0" encoding="utf-8"?>
+<p:sld xmlns:a="http://schemas.openxmlformats.org/drawingml/2006/main" xmlns:r="http://schemas.openxmlformats.org/officeDocument/2006/relationships" xmlns:p="http://schemas.openxmlformats.org/presentationml/2006/main">
+  <p:cSld>
+    <p:spTree>
+      <p:nvGrpSpPr>
+        <p:cNvPr id="1" name=""/>
+        <p:cNvGrpSpPr/>
+        <p:nvPr/>
+      </p:nvGrpSpPr>
+      <p:grpSpPr>
+        <a:xfrm>
+          <a:off x="0" y="0"/>
+          <a:ext cx="0" cy="0"/>
+          <a:chOff x="0" y="0"/>
+          <a:chExt cx="0" cy="0"/>
+        </a:xfrm>
+      </p:grpSpPr>
+      <p:sp>
+        <p:nvSpPr>
+          <p:cNvPr id="4" name="Title 3"/>
+          <p:cNvSpPr>
+            <a:spLocks noGrp="1"/>
+          </p:cNvSpPr>
+          <p:nvPr>
+            <p:ph type="title"/>
+          </p:nvPr>
+        </p:nvSpPr>
+        <p:spPr/>
+        <p:txBody>
+          <a:bodyPr>
+            <a:normAutofit fontScale="90000"/>
+          </a:bodyPr>
+          <a:lstStyle/>
+          <a:p>
+            <a:r>
+              <a:rPr lang="en-US" sz="4900" dirty="0"/>
               <a:t>Recreate Figure 1:</a:t>
             </a:r>
-            <a:r>
-              <a:rPr lang="en-US" dirty="0" smtClean="0"/>
-              <a:t/>
-            </a:r>
             <a:br>
-              <a:rPr lang="en-US" dirty="0" smtClean="0"/>
+              <a:rPr lang="en-US" dirty="0"/>
             </a:br>
             <a:r>
-              <a:rPr lang="en-US" sz="3100" dirty="0" smtClean="0"/>
+              <a:rPr lang="en-US" sz="3100" dirty="0"/>
               <a:t>Overview of workflow</a:t>
             </a:r>
             <a:endParaRPr lang="en-US" sz="4000" dirty="0"/>
@@ -3164,7 +4847,7 @@
               <a:buChar char="•"/>
             </a:pPr>
             <a:r>
-              <a:rPr lang="en-US" sz="2400" dirty="0" smtClean="0"/>
+              <a:rPr lang="en-US" sz="2400" dirty="0"/>
               <a:t>Utilized formatted data provided by group</a:t>
             </a:r>
           </a:p>
@@ -3174,7 +4857,7 @@
               <a:buChar char="•"/>
             </a:pPr>
             <a:r>
-              <a:rPr lang="en-US" sz="2400" dirty="0" smtClean="0"/>
+              <a:rPr lang="en-US" sz="2400" dirty="0"/>
               <a:t>Filter out hybrids and then subset data into processing genotypes</a:t>
             </a:r>
           </a:p>
@@ -3184,7 +4867,7 @@
               <a:buChar char="•"/>
             </a:pPr>
             <a:r>
-              <a:rPr lang="en-US" sz="2400" dirty="0" smtClean="0"/>
+              <a:rPr lang="en-US" sz="2400" dirty="0"/>
               <a:t>Imputed missing data</a:t>
             </a:r>
           </a:p>
@@ -3194,7 +4877,7 @@
               <a:buChar char="-"/>
             </a:pPr>
             <a:r>
-              <a:rPr lang="en-US" sz="2400" dirty="0" smtClean="0"/>
+              <a:rPr lang="en-US" sz="2400" dirty="0"/>
               <a:t> Paper mentioned package in R, but no code or indication of parameters they used. Needed to guess</a:t>
             </a:r>
           </a:p>
@@ -3204,7 +4887,7 @@
               <a:buChar char="•"/>
             </a:pPr>
             <a:r>
-              <a:rPr lang="en-US" sz="2400" dirty="0" smtClean="0"/>
+              <a:rPr lang="en-US" sz="2400" dirty="0"/>
               <a:t>Format data to run PCA using base R package</a:t>
             </a:r>
           </a:p>
@@ -3214,26 +4897,26 @@
               <a:buChar char="•"/>
             </a:pPr>
             <a:r>
-              <a:rPr lang="en-US" sz="2400" dirty="0" smtClean="0"/>
+              <a:rPr lang="en-US" sz="2400" dirty="0"/>
               <a:t>Plot the data using codes</a:t>
             </a:r>
           </a:p>
           <a:p>
             <a:pPr indent="292100"/>
             <a:r>
-              <a:rPr lang="en-US" sz="2400" dirty="0" smtClean="0"/>
+              <a:rPr lang="en-US" sz="2400" dirty="0"/>
               <a:t>- Market class they provided was post analysis vs. pre and post analysis</a:t>
             </a:r>
           </a:p>
           <a:p>
-            <a:endParaRPr lang="en-US" sz="2400" dirty="0" smtClean="0"/>
+            <a:endParaRPr lang="en-US" sz="2400" dirty="0"/>
           </a:p>
           <a:p>
             <a:pPr marL="285750" indent="-285750">
               <a:buFontTx/>
               <a:buChar char="-"/>
             </a:pPr>
-            <a:endParaRPr lang="en-US" sz="2400" dirty="0" smtClean="0"/>
+            <a:endParaRPr lang="en-US" sz="2400" dirty="0"/>
           </a:p>
           <a:p>
             <a:endParaRPr lang="en-US" sz="2400" dirty="0"/>
@@ -3250,17 +4933,10 @@
   <p:clrMapOvr>
     <a:masterClrMapping/>
   </p:clrMapOvr>
-  <p:timing>
-    <p:tnLst>
-      <p:par>
-        <p:cTn id="1" dur="indefinite" restart="never" nodeType="tmRoot"/>
-      </p:par>
-    </p:tnLst>
-  </p:timing>
 </p:sld>
 </file>
 
-<file path=ppt/slides/slide2.xml><?xml version="1.0" encoding="utf-8"?>
+<file path=ppt/slides/slide8.xml><?xml version="1.0" encoding="utf-8"?>
 <p:sld xmlns:a="http://schemas.openxmlformats.org/drawingml/2006/main" xmlns:r="http://schemas.openxmlformats.org/officeDocument/2006/relationships" xmlns:p="http://schemas.openxmlformats.org/presentationml/2006/main">
   <p:cSld>
     <p:spTree>
@@ -3451,21 +5127,16 @@
           <a:lstStyle/>
           <a:p>
             <a:r>
-              <a:rPr lang="en-US" sz="4900" dirty="0" smtClean="0"/>
+              <a:rPr lang="en-US" sz="4900" dirty="0"/>
               <a:t>Recreate Figure 1:</a:t>
             </a:r>
-            <a:r>
-              <a:rPr lang="en-US" dirty="0" smtClean="0"/>
-              <a:t/>
-            </a:r>
             <a:br>
-              <a:rPr lang="en-US" dirty="0" smtClean="0"/>
+              <a:rPr lang="en-US" dirty="0"/>
             </a:br>
             <a:r>
-              <a:rPr lang="en-US" sz="3100" dirty="0" smtClean="0"/>
+              <a:rPr lang="en-US" sz="3100" dirty="0"/>
               <a:t>Results</a:t>
             </a:r>
-            <a:endParaRPr lang="en-US" sz="3100" dirty="0"/>
           </a:p>
         </p:txBody>
       </p:sp>
@@ -3497,10 +5168,9 @@
           <a:lstStyle/>
           <a:p>
             <a:r>
-              <a:rPr lang="en-US" b="1" dirty="0" smtClean="0"/>
+              <a:rPr lang="en-US" b="1" dirty="0"/>
               <a:t>ORIGINAL</a:t>
             </a:r>
-            <a:endParaRPr lang="en-US" b="1" dirty="0"/>
           </a:p>
         </p:txBody>
       </p:sp>
@@ -3532,10 +5202,9 @@
           <a:lstStyle/>
           <a:p>
             <a:r>
-              <a:rPr lang="en-US" b="1" dirty="0" smtClean="0"/>
+              <a:rPr lang="en-US" b="1" dirty="0"/>
               <a:t>Recreated</a:t>
             </a:r>
-            <a:endParaRPr lang="en-US" b="1" dirty="0"/>
           </a:p>
         </p:txBody>
       </p:sp>
@@ -3549,17 +5218,10 @@
   <p:clrMapOvr>
     <a:masterClrMapping/>
   </p:clrMapOvr>
-  <p:timing>
-    <p:tnLst>
-      <p:par>
-        <p:cTn id="1" dur="indefinite" restart="never" nodeType="tmRoot"/>
-      </p:par>
-    </p:tnLst>
-  </p:timing>
 </p:sld>
 </file>
 
-<file path=ppt/slides/slide3.xml><?xml version="1.0" encoding="utf-8"?>
+<file path=ppt/slides/slide9.xml><?xml version="1.0" encoding="utf-8"?>
 <p:sld xmlns:a="http://schemas.openxmlformats.org/drawingml/2006/main" xmlns:r="http://schemas.openxmlformats.org/officeDocument/2006/relationships" xmlns:p="http://schemas.openxmlformats.org/presentationml/2006/main">
   <p:cSld>
     <p:spTree>
@@ -3594,17 +5256,16 @@
           <a:lstStyle/>
           <a:p>
             <a:r>
-              <a:rPr lang="en-US" dirty="0" smtClean="0"/>
+              <a:rPr lang="en-US" dirty="0"/>
               <a:t>Confirm results w/Structure Analysis:</a:t>
             </a:r>
             <a:br>
-              <a:rPr lang="en-US" dirty="0" smtClean="0"/>
+              <a:rPr lang="en-US" dirty="0"/>
             </a:br>
             <a:r>
-              <a:rPr lang="en-US" sz="3600" dirty="0" smtClean="0"/>
+              <a:rPr lang="en-US" sz="3600" dirty="0"/>
               <a:t>Overview of workflow</a:t>
             </a:r>
-            <a:endParaRPr lang="en-US" sz="3600" dirty="0"/>
           </a:p>
         </p:txBody>
       </p:sp>
@@ -3635,7 +5296,7 @@
               <a:buChar char="•"/>
             </a:pPr>
             <a:r>
-              <a:rPr lang="en-US" sz="2400" dirty="0" smtClean="0"/>
+              <a:rPr lang="en-US" sz="2400" dirty="0"/>
               <a:t>Utilized formatted data provided by group</a:t>
             </a:r>
           </a:p>
@@ -3645,7 +5306,7 @@
               <a:buChar char="•"/>
             </a:pPr>
             <a:r>
-              <a:rPr lang="en-US" sz="2400" dirty="0" smtClean="0"/>
+              <a:rPr lang="en-US" sz="2400" dirty="0"/>
               <a:t>Filter out hybrids and then subset data into processing genotypes</a:t>
             </a:r>
           </a:p>
@@ -3655,15 +5316,15 @@
               <a:buChar char="•"/>
             </a:pPr>
             <a:r>
-              <a:rPr lang="en-US" sz="2400" dirty="0" smtClean="0"/>
+              <a:rPr lang="en-US" sz="2400" dirty="0"/>
               <a:t>Convert genotype data file into .</a:t>
             </a:r>
             <a:r>
-              <a:rPr lang="en-US" sz="2400" dirty="0" err="1" smtClean="0"/>
+              <a:rPr lang="en-US" sz="2400" dirty="0" err="1"/>
               <a:t>ped</a:t>
             </a:r>
             <a:r>
-              <a:rPr lang="en-US" sz="2400" dirty="0" smtClean="0"/>
+              <a:rPr lang="en-US" sz="2400" dirty="0"/>
               <a:t> format (plink, Purcell, et. al 2007, Amer. J Human Gen)</a:t>
             </a:r>
           </a:p>
@@ -3673,7 +5334,7 @@
               <a:buChar char="•"/>
             </a:pPr>
             <a:r>
-              <a:rPr lang="en-US" sz="2400" dirty="0" smtClean="0"/>
+              <a:rPr lang="en-US" sz="2400" dirty="0"/>
               <a:t>Use plink to convert files to .bed format</a:t>
             </a:r>
           </a:p>
@@ -3683,15 +5344,15 @@
               <a:buChar char="•"/>
             </a:pPr>
             <a:r>
-              <a:rPr lang="en-US" sz="2400" dirty="0" smtClean="0"/>
+              <a:rPr lang="en-US" sz="2400" dirty="0"/>
               <a:t>Send .bed files to </a:t>
             </a:r>
             <a:r>
-              <a:rPr lang="en-US" sz="2400" dirty="0" err="1" smtClean="0"/>
+              <a:rPr lang="en-US" sz="2400" dirty="0" err="1"/>
               <a:t>linux</a:t>
             </a:r>
             <a:r>
-              <a:rPr lang="en-US" sz="2400" dirty="0" smtClean="0"/>
+              <a:rPr lang="en-US" sz="2400" dirty="0"/>
               <a:t> server to run Admixture (Alexander, et. al 2009, Genome Research)</a:t>
             </a:r>
           </a:p>
@@ -3701,7 +5362,7 @@
               <a:buChar char="•"/>
             </a:pPr>
             <a:r>
-              <a:rPr lang="en-US" sz="2400" dirty="0" smtClean="0"/>
+              <a:rPr lang="en-US" sz="2400" dirty="0"/>
               <a:t>Import .Q files into R for data manipulation</a:t>
             </a:r>
           </a:p>
@@ -3710,7 +5371,7 @@
               <a:buFontTx/>
               <a:buChar char="-"/>
             </a:pPr>
-            <a:endParaRPr lang="en-US" sz="2400" dirty="0" smtClean="0"/>
+            <a:endParaRPr lang="en-US" sz="2400" dirty="0"/>
           </a:p>
           <a:p>
             <a:endParaRPr lang="en-US" sz="2400" dirty="0"/>
@@ -3727,497 +5388,6 @@
   <p:clrMapOvr>
     <a:masterClrMapping/>
   </p:clrMapOvr>
-  <p:timing>
-    <p:tnLst>
-      <p:par>
-        <p:cTn id="1" dur="indefinite" restart="never" nodeType="tmRoot"/>
-      </p:par>
-    </p:tnLst>
-  </p:timing>
-</p:sld>
-</file>
-
-<file path=ppt/slides/slide4.xml><?xml version="1.0" encoding="utf-8"?>
-<p:sld xmlns:a="http://schemas.openxmlformats.org/drawingml/2006/main" xmlns:r="http://schemas.openxmlformats.org/officeDocument/2006/relationships" xmlns:p="http://schemas.openxmlformats.org/presentationml/2006/main">
-  <p:cSld>
-    <p:spTree>
-      <p:nvGrpSpPr>
-        <p:cNvPr id="1" name=""/>
-        <p:cNvGrpSpPr/>
-        <p:nvPr/>
-      </p:nvGrpSpPr>
-      <p:grpSpPr>
-        <a:xfrm>
-          <a:off x="0" y="0"/>
-          <a:ext cx="0" cy="0"/>
-          <a:chOff x="0" y="0"/>
-          <a:chExt cx="0" cy="0"/>
-        </a:xfrm>
-      </p:grpSpPr>
-      <p:sp>
-        <p:nvSpPr>
-          <p:cNvPr id="2" name="Title 1"/>
-          <p:cNvSpPr>
-            <a:spLocks noGrp="1"/>
-          </p:cNvSpPr>
-          <p:nvPr>
-            <p:ph type="title"/>
-          </p:nvPr>
-        </p:nvSpPr>
-        <p:spPr/>
-        <p:txBody>
-          <a:bodyPr>
-            <a:normAutofit fontScale="90000"/>
-          </a:bodyPr>
-          <a:lstStyle/>
-          <a:p>
-            <a:r>
-              <a:rPr lang="en-US" dirty="0" smtClean="0"/>
-              <a:t>Confirm results w/Structure Analysis:</a:t>
-            </a:r>
-            <a:br>
-              <a:rPr lang="en-US" dirty="0" smtClean="0"/>
-            </a:br>
-            <a:r>
-              <a:rPr lang="en-US" sz="3600" dirty="0" smtClean="0"/>
-              <a:t>Results: Full Dataset</a:t>
-            </a:r>
-            <a:endParaRPr lang="en-US" sz="3600" dirty="0"/>
-          </a:p>
-        </p:txBody>
-      </p:sp>
-      <p:pic>
-        <p:nvPicPr>
-          <p:cNvPr id="2050" name="Picture 2"/>
-          <p:cNvPicPr>
-            <a:picLocks noChangeAspect="1" noChangeArrowheads="1"/>
-          </p:cNvPicPr>
-          <p:nvPr/>
-        </p:nvPicPr>
-        <p:blipFill rotWithShape="1">
-          <a:blip r:embed="rId2">
-            <a:extLst>
-              <a:ext uri="{28A0092B-C50C-407E-A947-70E740481C1C}">
-                <a14:useLocalDpi xmlns:a14="http://schemas.microsoft.com/office/drawing/2010/main" val="0"/>
-              </a:ext>
-            </a:extLst>
-          </a:blip>
-          <a:srcRect l="2869" t="11600" r="2671" b="12788"/>
-          <a:stretch/>
-        </p:blipFill>
-        <p:spPr bwMode="auto">
-          <a:xfrm>
-            <a:off x="228600" y="1600200"/>
-            <a:ext cx="8686800" cy="4921004"/>
-          </a:xfrm>
-          <a:prstGeom prst="rect">
-            <a:avLst/>
-          </a:prstGeom>
-          <a:noFill/>
-          <a:ln>
-            <a:noFill/>
-          </a:ln>
-          <a:extLst>
-            <a:ext uri="{909E8E84-426E-40DD-AFC4-6F175D3DCCD1}">
-              <a14:hiddenFill xmlns:a14="http://schemas.microsoft.com/office/drawing/2010/main">
-                <a:solidFill>
-                  <a:schemeClr val="accent1"/>
-                </a:solidFill>
-              </a14:hiddenFill>
-            </a:ext>
-            <a:ext uri="{91240B29-F687-4F45-9708-019B960494DF}">
-              <a14:hiddenLine xmlns:a14="http://schemas.microsoft.com/office/drawing/2010/main" w="9525">
-                <a:solidFill>
-                  <a:schemeClr val="tx1"/>
-                </a:solidFill>
-                <a:miter lim="800000"/>
-                <a:headEnd/>
-                <a:tailEnd/>
-              </a14:hiddenLine>
-            </a:ext>
-          </a:extLst>
-        </p:spPr>
-      </p:pic>
-    </p:spTree>
-    <p:extLst>
-      <p:ext uri="{BB962C8B-B14F-4D97-AF65-F5344CB8AC3E}">
-        <p14:creationId xmlns:p14="http://schemas.microsoft.com/office/powerpoint/2010/main" val="4103679333"/>
-      </p:ext>
-    </p:extLst>
-  </p:cSld>
-  <p:clrMapOvr>
-    <a:masterClrMapping/>
-  </p:clrMapOvr>
-  <p:timing>
-    <p:tnLst>
-      <p:par>
-        <p:cTn id="1" dur="indefinite" restart="never" nodeType="tmRoot"/>
-      </p:par>
-    </p:tnLst>
-  </p:timing>
-</p:sld>
-</file>
-
-<file path=ppt/slides/slide5.xml><?xml version="1.0" encoding="utf-8"?>
-<p:sld xmlns:a="http://schemas.openxmlformats.org/drawingml/2006/main" xmlns:r="http://schemas.openxmlformats.org/officeDocument/2006/relationships" xmlns:p="http://schemas.openxmlformats.org/presentationml/2006/main">
-  <p:cSld>
-    <p:spTree>
-      <p:nvGrpSpPr>
-        <p:cNvPr id="1" name=""/>
-        <p:cNvGrpSpPr/>
-        <p:nvPr/>
-      </p:nvGrpSpPr>
-      <p:grpSpPr>
-        <a:xfrm>
-          <a:off x="0" y="0"/>
-          <a:ext cx="0" cy="0"/>
-          <a:chOff x="0" y="0"/>
-          <a:chExt cx="0" cy="0"/>
-        </a:xfrm>
-      </p:grpSpPr>
-      <p:sp>
-        <p:nvSpPr>
-          <p:cNvPr id="2" name="Title 1"/>
-          <p:cNvSpPr>
-            <a:spLocks noGrp="1"/>
-          </p:cNvSpPr>
-          <p:nvPr>
-            <p:ph type="title"/>
-          </p:nvPr>
-        </p:nvSpPr>
-        <p:spPr/>
-        <p:txBody>
-          <a:bodyPr>
-            <a:normAutofit fontScale="90000"/>
-          </a:bodyPr>
-          <a:lstStyle/>
-          <a:p>
-            <a:r>
-              <a:rPr lang="en-US" dirty="0" smtClean="0"/>
-              <a:t>Confirm results w/Structure Analysis:</a:t>
-            </a:r>
-            <a:br>
-              <a:rPr lang="en-US" dirty="0" smtClean="0"/>
-            </a:br>
-            <a:r>
-              <a:rPr lang="en-US" sz="3600" dirty="0" smtClean="0"/>
-              <a:t>Results: Full Dataset</a:t>
-            </a:r>
-            <a:endParaRPr lang="en-US" dirty="0"/>
-          </a:p>
-        </p:txBody>
-      </p:sp>
-      <p:pic>
-        <p:nvPicPr>
-          <p:cNvPr id="3074" name="Picture 2"/>
-          <p:cNvPicPr>
-            <a:picLocks noChangeAspect="1" noChangeArrowheads="1"/>
-          </p:cNvPicPr>
-          <p:nvPr/>
-        </p:nvPicPr>
-        <p:blipFill rotWithShape="1">
-          <a:blip r:embed="rId2">
-            <a:extLst>
-              <a:ext uri="{28A0092B-C50C-407E-A947-70E740481C1C}">
-                <a14:useLocalDpi xmlns:a14="http://schemas.microsoft.com/office/drawing/2010/main" val="0"/>
-              </a:ext>
-            </a:extLst>
-          </a:blip>
-          <a:srcRect l="3363" t="11461" r="2671" b="12369"/>
-          <a:stretch/>
-        </p:blipFill>
-        <p:spPr bwMode="auto">
-          <a:xfrm>
-            <a:off x="284387" y="1600200"/>
-            <a:ext cx="8575226" cy="4919472"/>
-          </a:xfrm>
-          <a:prstGeom prst="rect">
-            <a:avLst/>
-          </a:prstGeom>
-          <a:noFill/>
-          <a:ln>
-            <a:noFill/>
-          </a:ln>
-          <a:extLst>
-            <a:ext uri="{909E8E84-426E-40DD-AFC4-6F175D3DCCD1}">
-              <a14:hiddenFill xmlns:a14="http://schemas.microsoft.com/office/drawing/2010/main">
-                <a:solidFill>
-                  <a:schemeClr val="accent1"/>
-                </a:solidFill>
-              </a14:hiddenFill>
-            </a:ext>
-            <a:ext uri="{91240B29-F687-4F45-9708-019B960494DF}">
-              <a14:hiddenLine xmlns:a14="http://schemas.microsoft.com/office/drawing/2010/main" w="9525">
-                <a:solidFill>
-                  <a:schemeClr val="tx1"/>
-                </a:solidFill>
-                <a:miter lim="800000"/>
-                <a:headEnd/>
-                <a:tailEnd/>
-              </a14:hiddenLine>
-            </a:ext>
-          </a:extLst>
-        </p:spPr>
-      </p:pic>
-    </p:spTree>
-    <p:extLst>
-      <p:ext uri="{BB962C8B-B14F-4D97-AF65-F5344CB8AC3E}">
-        <p14:creationId xmlns:p14="http://schemas.microsoft.com/office/powerpoint/2010/main" val="4023083018"/>
-      </p:ext>
-    </p:extLst>
-  </p:cSld>
-  <p:clrMapOvr>
-    <a:masterClrMapping/>
-  </p:clrMapOvr>
-  <p:timing>
-    <p:tnLst>
-      <p:par>
-        <p:cTn id="1" dur="indefinite" restart="never" nodeType="tmRoot"/>
-      </p:par>
-    </p:tnLst>
-  </p:timing>
-</p:sld>
-</file>
-
-<file path=ppt/slides/slide6.xml><?xml version="1.0" encoding="utf-8"?>
-<p:sld xmlns:a="http://schemas.openxmlformats.org/drawingml/2006/main" xmlns:r="http://schemas.openxmlformats.org/officeDocument/2006/relationships" xmlns:p="http://schemas.openxmlformats.org/presentationml/2006/main">
-  <p:cSld>
-    <p:spTree>
-      <p:nvGrpSpPr>
-        <p:cNvPr id="1" name=""/>
-        <p:cNvGrpSpPr/>
-        <p:nvPr/>
-      </p:nvGrpSpPr>
-      <p:grpSpPr>
-        <a:xfrm>
-          <a:off x="0" y="0"/>
-          <a:ext cx="0" cy="0"/>
-          <a:chOff x="0" y="0"/>
-          <a:chExt cx="0" cy="0"/>
-        </a:xfrm>
-      </p:grpSpPr>
-      <p:sp>
-        <p:nvSpPr>
-          <p:cNvPr id="2" name="Title 1"/>
-          <p:cNvSpPr>
-            <a:spLocks noGrp="1"/>
-          </p:cNvSpPr>
-          <p:nvPr>
-            <p:ph type="title"/>
-          </p:nvPr>
-        </p:nvSpPr>
-        <p:spPr/>
-        <p:txBody>
-          <a:bodyPr>
-            <a:normAutofit fontScale="90000"/>
-          </a:bodyPr>
-          <a:lstStyle/>
-          <a:p>
-            <a:r>
-              <a:rPr lang="en-US" dirty="0" smtClean="0"/>
-              <a:t>Confirm results w/Structure Analysis:</a:t>
-            </a:r>
-            <a:br>
-              <a:rPr lang="en-US" dirty="0" smtClean="0"/>
-            </a:br>
-            <a:r>
-              <a:rPr lang="en-US" sz="3600" dirty="0" smtClean="0"/>
-              <a:t>Results: Full Dataset</a:t>
-            </a:r>
-            <a:endParaRPr lang="en-US" dirty="0"/>
-          </a:p>
-        </p:txBody>
-      </p:sp>
-      <p:pic>
-        <p:nvPicPr>
-          <p:cNvPr id="4098" name="Picture 2"/>
-          <p:cNvPicPr>
-            <a:picLocks noChangeAspect="1" noChangeArrowheads="1"/>
-          </p:cNvPicPr>
-          <p:nvPr/>
-        </p:nvPicPr>
-        <p:blipFill rotWithShape="1">
-          <a:blip r:embed="rId2">
-            <a:extLst>
-              <a:ext uri="{28A0092B-C50C-407E-A947-70E740481C1C}">
-                <a14:useLocalDpi xmlns:a14="http://schemas.microsoft.com/office/drawing/2010/main" val="0"/>
-              </a:ext>
-            </a:extLst>
-          </a:blip>
-          <a:srcRect l="3264" t="2795" r="3659" b="3845"/>
-          <a:stretch/>
-        </p:blipFill>
-        <p:spPr bwMode="auto">
-          <a:xfrm>
-            <a:off x="800100" y="1447800"/>
-            <a:ext cx="7543800" cy="5355216"/>
-          </a:xfrm>
-          <a:prstGeom prst="rect">
-            <a:avLst/>
-          </a:prstGeom>
-          <a:noFill/>
-          <a:ln>
-            <a:noFill/>
-          </a:ln>
-          <a:extLst>
-            <a:ext uri="{909E8E84-426E-40DD-AFC4-6F175D3DCCD1}">
-              <a14:hiddenFill xmlns:a14="http://schemas.microsoft.com/office/drawing/2010/main">
-                <a:solidFill>
-                  <a:schemeClr val="accent1"/>
-                </a:solidFill>
-              </a14:hiddenFill>
-            </a:ext>
-            <a:ext uri="{91240B29-F687-4F45-9708-019B960494DF}">
-              <a14:hiddenLine xmlns:a14="http://schemas.microsoft.com/office/drawing/2010/main" w="9525">
-                <a:solidFill>
-                  <a:schemeClr val="tx1"/>
-                </a:solidFill>
-                <a:miter lim="800000"/>
-                <a:headEnd/>
-                <a:tailEnd/>
-              </a14:hiddenLine>
-            </a:ext>
-          </a:extLst>
-        </p:spPr>
-      </p:pic>
-    </p:spTree>
-    <p:extLst>
-      <p:ext uri="{BB962C8B-B14F-4D97-AF65-F5344CB8AC3E}">
-        <p14:creationId xmlns:p14="http://schemas.microsoft.com/office/powerpoint/2010/main" val="347851081"/>
-      </p:ext>
-    </p:extLst>
-  </p:cSld>
-  <p:clrMapOvr>
-    <a:masterClrMapping/>
-  </p:clrMapOvr>
-  <p:timing>
-    <p:tnLst>
-      <p:par>
-        <p:cTn id="1" dur="indefinite" restart="never" nodeType="tmRoot"/>
-      </p:par>
-    </p:tnLst>
-  </p:timing>
-</p:sld>
-</file>
-
-<file path=ppt/slides/slide7.xml><?xml version="1.0" encoding="utf-8"?>
-<p:sld xmlns:a="http://schemas.openxmlformats.org/drawingml/2006/main" xmlns:r="http://schemas.openxmlformats.org/officeDocument/2006/relationships" xmlns:p="http://schemas.openxmlformats.org/presentationml/2006/main">
-  <p:cSld>
-    <p:spTree>
-      <p:nvGrpSpPr>
-        <p:cNvPr id="1" name=""/>
-        <p:cNvGrpSpPr/>
-        <p:nvPr/>
-      </p:nvGrpSpPr>
-      <p:grpSpPr>
-        <a:xfrm>
-          <a:off x="0" y="0"/>
-          <a:ext cx="0" cy="0"/>
-          <a:chOff x="0" y="0"/>
-          <a:chExt cx="0" cy="0"/>
-        </a:xfrm>
-      </p:grpSpPr>
-      <p:sp>
-        <p:nvSpPr>
-          <p:cNvPr id="2" name="Title 1"/>
-          <p:cNvSpPr>
-            <a:spLocks noGrp="1"/>
-          </p:cNvSpPr>
-          <p:nvPr>
-            <p:ph type="title"/>
-          </p:nvPr>
-        </p:nvSpPr>
-        <p:spPr/>
-        <p:txBody>
-          <a:bodyPr>
-            <a:normAutofit fontScale="90000"/>
-          </a:bodyPr>
-          <a:lstStyle/>
-          <a:p>
-            <a:r>
-              <a:rPr lang="en-US" dirty="0" smtClean="0"/>
-              <a:t>Confirm results w/Structure Analysis:</a:t>
-            </a:r>
-            <a:br>
-              <a:rPr lang="en-US" dirty="0" smtClean="0"/>
-            </a:br>
-            <a:r>
-              <a:rPr lang="en-US" sz="3600" dirty="0" smtClean="0"/>
-              <a:t>Results: Processing Dataset</a:t>
-            </a:r>
-            <a:endParaRPr lang="en-US" dirty="0"/>
-          </a:p>
-        </p:txBody>
-      </p:sp>
-      <p:pic>
-        <p:nvPicPr>
-          <p:cNvPr id="6146" name="Picture 2"/>
-          <p:cNvPicPr>
-            <a:picLocks noChangeAspect="1" noChangeArrowheads="1"/>
-          </p:cNvPicPr>
-          <p:nvPr/>
-        </p:nvPicPr>
-        <p:blipFill rotWithShape="1">
-          <a:blip r:embed="rId2">
-            <a:extLst>
-              <a:ext uri="{28A0092B-C50C-407E-A947-70E740481C1C}">
-                <a14:useLocalDpi xmlns:a14="http://schemas.microsoft.com/office/drawing/2010/main" val="0"/>
-              </a:ext>
-            </a:extLst>
-          </a:blip>
-          <a:srcRect l="9199" t="2796" r="6528" b="4262"/>
-          <a:stretch/>
-        </p:blipFill>
-        <p:spPr bwMode="auto">
-          <a:xfrm>
-            <a:off x="1156865" y="1501462"/>
-            <a:ext cx="6830270" cy="5331138"/>
-          </a:xfrm>
-          <a:prstGeom prst="rect">
-            <a:avLst/>
-          </a:prstGeom>
-          <a:noFill/>
-          <a:ln>
-            <a:noFill/>
-          </a:ln>
-          <a:extLst>
-            <a:ext uri="{909E8E84-426E-40DD-AFC4-6F175D3DCCD1}">
-              <a14:hiddenFill xmlns:a14="http://schemas.microsoft.com/office/drawing/2010/main">
-                <a:solidFill>
-                  <a:schemeClr val="accent1"/>
-                </a:solidFill>
-              </a14:hiddenFill>
-            </a:ext>
-            <a:ext uri="{91240B29-F687-4F45-9708-019B960494DF}">
-              <a14:hiddenLine xmlns:a14="http://schemas.microsoft.com/office/drawing/2010/main" w="9525">
-                <a:solidFill>
-                  <a:schemeClr val="tx1"/>
-                </a:solidFill>
-                <a:miter lim="800000"/>
-                <a:headEnd/>
-                <a:tailEnd/>
-              </a14:hiddenLine>
-            </a:ext>
-          </a:extLst>
-        </p:spPr>
-      </p:pic>
-    </p:spTree>
-    <p:extLst>
-      <p:ext uri="{BB962C8B-B14F-4D97-AF65-F5344CB8AC3E}">
-        <p14:creationId xmlns:p14="http://schemas.microsoft.com/office/powerpoint/2010/main" val="1833174166"/>
-      </p:ext>
-    </p:extLst>
-  </p:cSld>
-  <p:clrMapOvr>
-    <a:masterClrMapping/>
-  </p:clrMapOvr>
-  <p:timing>
-    <p:tnLst>
-      <p:par>
-        <p:cTn id="1" dur="indefinite" restart="never" nodeType="tmRoot"/>
-      </p:par>
-    </p:tnLst>
-  </p:timing>
 </p:sld>
 </file>
 
@@ -4504,4 +5674,299 @@
   <a:objectDefaults/>
   <a:extraClrSchemeLst/>
 </a:theme>
+</file>
+
+<file path=ppt/theme/theme2.xml><?xml version="1.0" encoding="utf-8"?>
+<a:theme xmlns:a="http://schemas.openxmlformats.org/drawingml/2006/main" name="Office Theme">
+  <a:themeElements>
+    <a:clrScheme name="Office">
+      <a:dk1>
+        <a:sysClr val="windowText" lastClr="000000"/>
+      </a:dk1>
+      <a:lt1>
+        <a:sysClr val="window" lastClr="FFFFFF"/>
+      </a:lt1>
+      <a:dk2>
+        <a:srgbClr val="44546A"/>
+      </a:dk2>
+      <a:lt2>
+        <a:srgbClr val="E7E6E6"/>
+      </a:lt2>
+      <a:accent1>
+        <a:srgbClr val="4472C4"/>
+      </a:accent1>
+      <a:accent2>
+        <a:srgbClr val="ED7D31"/>
+      </a:accent2>
+      <a:accent3>
+        <a:srgbClr val="A5A5A5"/>
+      </a:accent3>
+      <a:accent4>
+        <a:srgbClr val="FFC000"/>
+      </a:accent4>
+      <a:accent5>
+        <a:srgbClr val="5B9BD5"/>
+      </a:accent5>
+      <a:accent6>
+        <a:srgbClr val="70AD47"/>
+      </a:accent6>
+      <a:hlink>
+        <a:srgbClr val="0563C1"/>
+      </a:hlink>
+      <a:folHlink>
+        <a:srgbClr val="954F72"/>
+      </a:folHlink>
+    </a:clrScheme>
+    <a:fontScheme name="Office">
+      <a:majorFont>
+        <a:latin typeface="Calibri Light" panose="020F0302020204030204"/>
+        <a:ea typeface=""/>
+        <a:cs typeface=""/>
+        <a:font script="Jpan" typeface="游ゴシック Light"/>
+        <a:font script="Hang" typeface="맑은 고딕"/>
+        <a:font script="Hans" typeface="等线 Light"/>
+        <a:font script="Hant" typeface="新細明體"/>
+        <a:font script="Arab" typeface="Times New Roman"/>
+        <a:font script="Hebr" typeface="Times New Roman"/>
+        <a:font script="Thai" typeface="Angsana New"/>
+        <a:font script="Ethi" typeface="Nyala"/>
+        <a:font script="Beng" typeface="Vrinda"/>
+        <a:font script="Gujr" typeface="Shruti"/>
+        <a:font script="Khmr" typeface="MoolBoran"/>
+        <a:font script="Knda" typeface="Tunga"/>
+        <a:font script="Guru" typeface="Raavi"/>
+        <a:font script="Cans" typeface="Euphemia"/>
+        <a:font script="Cher" typeface="Plantagenet Cherokee"/>
+        <a:font script="Yiii" typeface="Microsoft Yi Baiti"/>
+        <a:font script="Tibt" typeface="Microsoft Himalaya"/>
+        <a:font script="Thaa" typeface="MV Boli"/>
+        <a:font script="Deva" typeface="Mangal"/>
+        <a:font script="Telu" typeface="Gautami"/>
+        <a:font script="Taml" typeface="Latha"/>
+        <a:font script="Syrc" typeface="Estrangelo Edessa"/>
+        <a:font script="Orya" typeface="Kalinga"/>
+        <a:font script="Mlym" typeface="Kartika"/>
+        <a:font script="Laoo" typeface="DokChampa"/>
+        <a:font script="Sinh" typeface="Iskoola Pota"/>
+        <a:font script="Mong" typeface="Mongolian Baiti"/>
+        <a:font script="Viet" typeface="Times New Roman"/>
+        <a:font script="Uigh" typeface="Microsoft Uighur"/>
+        <a:font script="Geor" typeface="Sylfaen"/>
+        <a:font script="Armn" typeface="Arial"/>
+        <a:font script="Bugi" typeface="Leelawadee UI"/>
+        <a:font script="Bopo" typeface="Microsoft JhengHei"/>
+        <a:font script="Java" typeface="Javanese Text"/>
+        <a:font script="Lisu" typeface="Segoe UI"/>
+        <a:font script="Mymr" typeface="Myanmar Text"/>
+        <a:font script="Nkoo" typeface="Ebrima"/>
+        <a:font script="Olck" typeface="Nirmala UI"/>
+        <a:font script="Osma" typeface="Ebrima"/>
+        <a:font script="Phag" typeface="Phagspa"/>
+        <a:font script="Syrn" typeface="Estrangelo Edessa"/>
+        <a:font script="Syrj" typeface="Estrangelo Edessa"/>
+        <a:font script="Syre" typeface="Estrangelo Edessa"/>
+        <a:font script="Sora" typeface="Nirmala UI"/>
+        <a:font script="Tale" typeface="Microsoft Tai Le"/>
+        <a:font script="Talu" typeface="Microsoft New Tai Lue"/>
+        <a:font script="Tfng" typeface="Ebrima"/>
+      </a:majorFont>
+      <a:minorFont>
+        <a:latin typeface="Calibri" panose="020F0502020204030204"/>
+        <a:ea typeface=""/>
+        <a:cs typeface=""/>
+        <a:font script="Jpan" typeface="游ゴシック"/>
+        <a:font script="Hang" typeface="맑은 고딕"/>
+        <a:font script="Hans" typeface="等线"/>
+        <a:font script="Hant" typeface="新細明體"/>
+        <a:font script="Arab" typeface="Arial"/>
+        <a:font script="Hebr" typeface="Arial"/>
+        <a:font script="Thai" typeface="Cordia New"/>
+        <a:font script="Ethi" typeface="Nyala"/>
+        <a:font script="Beng" typeface="Vrinda"/>
+        <a:font script="Gujr" typeface="Shruti"/>
+        <a:font script="Khmr" typeface="DaunPenh"/>
+        <a:font script="Knda" typeface="Tunga"/>
+        <a:font script="Guru" typeface="Raavi"/>
+        <a:font script="Cans" typeface="Euphemia"/>
+        <a:font script="Cher" typeface="Plantagenet Cherokee"/>
+        <a:font script="Yiii" typeface="Microsoft Yi Baiti"/>
+        <a:font script="Tibt" typeface="Microsoft Himalaya"/>
+        <a:font script="Thaa" typeface="MV Boli"/>
+        <a:font script="Deva" typeface="Mangal"/>
+        <a:font script="Telu" typeface="Gautami"/>
+        <a:font script="Taml" typeface="Latha"/>
+        <a:font script="Syrc" typeface="Estrangelo Edessa"/>
+        <a:font script="Orya" typeface="Kalinga"/>
+        <a:font script="Mlym" typeface="Kartika"/>
+        <a:font script="Laoo" typeface="DokChampa"/>
+        <a:font script="Sinh" typeface="Iskoola Pota"/>
+        <a:font script="Mong" typeface="Mongolian Baiti"/>
+        <a:font script="Viet" typeface="Arial"/>
+        <a:font script="Uigh" typeface="Microsoft Uighur"/>
+        <a:font script="Geor" typeface="Sylfaen"/>
+        <a:font script="Armn" typeface="Arial"/>
+        <a:font script="Bugi" typeface="Leelawadee UI"/>
+        <a:font script="Bopo" typeface="Microsoft JhengHei"/>
+        <a:font script="Java" typeface="Javanese Text"/>
+        <a:font script="Lisu" typeface="Segoe UI"/>
+        <a:font script="Mymr" typeface="Myanmar Text"/>
+        <a:font script="Nkoo" typeface="Ebrima"/>
+        <a:font script="Olck" typeface="Nirmala UI"/>
+        <a:font script="Osma" typeface="Ebrima"/>
+        <a:font script="Phag" typeface="Phagspa"/>
+        <a:font script="Syrn" typeface="Estrangelo Edessa"/>
+        <a:font script="Syrj" typeface="Estrangelo Edessa"/>
+        <a:font script="Syre" typeface="Estrangelo Edessa"/>
+        <a:font script="Sora" typeface="Nirmala UI"/>
+        <a:font script="Tale" typeface="Microsoft Tai Le"/>
+        <a:font script="Talu" typeface="Microsoft New Tai Lue"/>
+        <a:font script="Tfng" typeface="Ebrima"/>
+      </a:minorFont>
+    </a:fontScheme>
+    <a:fmtScheme name="Office">
+      <a:fillStyleLst>
+        <a:solidFill>
+          <a:schemeClr val="phClr"/>
+        </a:solidFill>
+        <a:gradFill rotWithShape="1">
+          <a:gsLst>
+            <a:gs pos="0">
+              <a:schemeClr val="phClr">
+                <a:lumMod val="110000"/>
+                <a:satMod val="105000"/>
+                <a:tint val="67000"/>
+              </a:schemeClr>
+            </a:gs>
+            <a:gs pos="50000">
+              <a:schemeClr val="phClr">
+                <a:lumMod val="105000"/>
+                <a:satMod val="103000"/>
+                <a:tint val="73000"/>
+              </a:schemeClr>
+            </a:gs>
+            <a:gs pos="100000">
+              <a:schemeClr val="phClr">
+                <a:lumMod val="105000"/>
+                <a:satMod val="109000"/>
+                <a:tint val="81000"/>
+              </a:schemeClr>
+            </a:gs>
+          </a:gsLst>
+          <a:lin ang="5400000" scaled="0"/>
+        </a:gradFill>
+        <a:gradFill rotWithShape="1">
+          <a:gsLst>
+            <a:gs pos="0">
+              <a:schemeClr val="phClr">
+                <a:satMod val="103000"/>
+                <a:lumMod val="102000"/>
+                <a:tint val="94000"/>
+              </a:schemeClr>
+            </a:gs>
+            <a:gs pos="50000">
+              <a:schemeClr val="phClr">
+                <a:satMod val="110000"/>
+                <a:lumMod val="100000"/>
+                <a:shade val="100000"/>
+              </a:schemeClr>
+            </a:gs>
+            <a:gs pos="100000">
+              <a:schemeClr val="phClr">
+                <a:lumMod val="99000"/>
+                <a:satMod val="120000"/>
+                <a:shade val="78000"/>
+              </a:schemeClr>
+            </a:gs>
+          </a:gsLst>
+          <a:lin ang="5400000" scaled="0"/>
+        </a:gradFill>
+      </a:fillStyleLst>
+      <a:lnStyleLst>
+        <a:ln w="6350" cap="flat" cmpd="sng" algn="ctr">
+          <a:solidFill>
+            <a:schemeClr val="phClr"/>
+          </a:solidFill>
+          <a:prstDash val="solid"/>
+          <a:miter lim="800000"/>
+        </a:ln>
+        <a:ln w="12700" cap="flat" cmpd="sng" algn="ctr">
+          <a:solidFill>
+            <a:schemeClr val="phClr"/>
+          </a:solidFill>
+          <a:prstDash val="solid"/>
+          <a:miter lim="800000"/>
+        </a:ln>
+        <a:ln w="19050" cap="flat" cmpd="sng" algn="ctr">
+          <a:solidFill>
+            <a:schemeClr val="phClr"/>
+          </a:solidFill>
+          <a:prstDash val="solid"/>
+          <a:miter lim="800000"/>
+        </a:ln>
+      </a:lnStyleLst>
+      <a:effectStyleLst>
+        <a:effectStyle>
+          <a:effectLst/>
+        </a:effectStyle>
+        <a:effectStyle>
+          <a:effectLst/>
+        </a:effectStyle>
+        <a:effectStyle>
+          <a:effectLst>
+            <a:outerShdw blurRad="57150" dist="19050" dir="5400000" algn="ctr" rotWithShape="0">
+              <a:srgbClr val="000000">
+                <a:alpha val="63000"/>
+              </a:srgbClr>
+            </a:outerShdw>
+          </a:effectLst>
+        </a:effectStyle>
+      </a:effectStyleLst>
+      <a:bgFillStyleLst>
+        <a:solidFill>
+          <a:schemeClr val="phClr"/>
+        </a:solidFill>
+        <a:solidFill>
+          <a:schemeClr val="phClr">
+            <a:tint val="95000"/>
+            <a:satMod val="170000"/>
+          </a:schemeClr>
+        </a:solidFill>
+        <a:gradFill rotWithShape="1">
+          <a:gsLst>
+            <a:gs pos="0">
+              <a:schemeClr val="phClr">
+                <a:tint val="93000"/>
+                <a:satMod val="150000"/>
+                <a:shade val="98000"/>
+                <a:lumMod val="102000"/>
+              </a:schemeClr>
+            </a:gs>
+            <a:gs pos="50000">
+              <a:schemeClr val="phClr">
+                <a:tint val="98000"/>
+                <a:satMod val="130000"/>
+                <a:shade val="90000"/>
+                <a:lumMod val="103000"/>
+              </a:schemeClr>
+            </a:gs>
+            <a:gs pos="100000">
+              <a:schemeClr val="phClr">
+                <a:shade val="63000"/>
+                <a:satMod val="120000"/>
+              </a:schemeClr>
+            </a:gs>
+          </a:gsLst>
+          <a:lin ang="5400000" scaled="0"/>
+        </a:gradFill>
+      </a:bgFillStyleLst>
+    </a:fmtScheme>
+  </a:themeElements>
+  <a:objectDefaults/>
+  <a:extraClrSchemeLst/>
+  <a:extLst>
+    <a:ext uri="{05A4C25C-085E-4340-85A3-A5531E510DB2}">
+      <thm15:themeFamily xmlns:thm15="http://schemas.microsoft.com/office/thememl/2012/main" name="Office Theme" id="{62F939B6-93AF-4DB8-9C6B-D6C7DFDC589F}" vid="{4A3C46E8-61CC-4603-A589-7422A47A8E4A}"/>
+    </a:ext>
+  </a:extLst>
+</a:theme>
 </file>
</xml_diff>